<commit_message>
Fix vdm mock file structure & Change dll extract mechanism
- VDM에 저장된 mock file 구조체를 수정 (struct.pptx) 참고,
- dll 추출 방법을 brute force로 변경
</commit_message>
<xml_diff>
--- a/struct.pptx
+++ b/struct.pptx
@@ -260,7 +260,7 @@
           <a:p>
             <a:fld id="{DE15D4B5-AEE3-42ED-9C3B-4D7A2F737357}" type="datetimeFigureOut">
               <a:rPr lang="ko-KR" altLang="en-US" smtClean="0"/>
-              <a:t>2021-04-25</a:t>
+              <a:t>2021-11-30</a:t>
             </a:fld>
             <a:endParaRPr lang="ko-KR" altLang="en-US"/>
           </a:p>
@@ -458,7 +458,7 @@
           <a:p>
             <a:fld id="{DE15D4B5-AEE3-42ED-9C3B-4D7A2F737357}" type="datetimeFigureOut">
               <a:rPr lang="ko-KR" altLang="en-US" smtClean="0"/>
-              <a:t>2021-04-25</a:t>
+              <a:t>2021-11-30</a:t>
             </a:fld>
             <a:endParaRPr lang="ko-KR" altLang="en-US"/>
           </a:p>
@@ -666,7 +666,7 @@
           <a:p>
             <a:fld id="{DE15D4B5-AEE3-42ED-9C3B-4D7A2F737357}" type="datetimeFigureOut">
               <a:rPr lang="ko-KR" altLang="en-US" smtClean="0"/>
-              <a:t>2021-04-25</a:t>
+              <a:t>2021-11-30</a:t>
             </a:fld>
             <a:endParaRPr lang="ko-KR" altLang="en-US"/>
           </a:p>
@@ -864,7 +864,7 @@
           <a:p>
             <a:fld id="{DE15D4B5-AEE3-42ED-9C3B-4D7A2F737357}" type="datetimeFigureOut">
               <a:rPr lang="ko-KR" altLang="en-US" smtClean="0"/>
-              <a:t>2021-04-25</a:t>
+              <a:t>2021-11-30</a:t>
             </a:fld>
             <a:endParaRPr lang="ko-KR" altLang="en-US"/>
           </a:p>
@@ -1139,7 +1139,7 @@
           <a:p>
             <a:fld id="{DE15D4B5-AEE3-42ED-9C3B-4D7A2F737357}" type="datetimeFigureOut">
               <a:rPr lang="ko-KR" altLang="en-US" smtClean="0"/>
-              <a:t>2021-04-25</a:t>
+              <a:t>2021-11-30</a:t>
             </a:fld>
             <a:endParaRPr lang="ko-KR" altLang="en-US"/>
           </a:p>
@@ -1404,7 +1404,7 @@
           <a:p>
             <a:fld id="{DE15D4B5-AEE3-42ED-9C3B-4D7A2F737357}" type="datetimeFigureOut">
               <a:rPr lang="ko-KR" altLang="en-US" smtClean="0"/>
-              <a:t>2021-04-25</a:t>
+              <a:t>2021-11-30</a:t>
             </a:fld>
             <a:endParaRPr lang="ko-KR" altLang="en-US"/>
           </a:p>
@@ -1816,7 +1816,7 @@
           <a:p>
             <a:fld id="{DE15D4B5-AEE3-42ED-9C3B-4D7A2F737357}" type="datetimeFigureOut">
               <a:rPr lang="ko-KR" altLang="en-US" smtClean="0"/>
-              <a:t>2021-04-25</a:t>
+              <a:t>2021-11-30</a:t>
             </a:fld>
             <a:endParaRPr lang="ko-KR" altLang="en-US"/>
           </a:p>
@@ -1957,7 +1957,7 @@
           <a:p>
             <a:fld id="{DE15D4B5-AEE3-42ED-9C3B-4D7A2F737357}" type="datetimeFigureOut">
               <a:rPr lang="ko-KR" altLang="en-US" smtClean="0"/>
-              <a:t>2021-04-25</a:t>
+              <a:t>2021-11-30</a:t>
             </a:fld>
             <a:endParaRPr lang="ko-KR" altLang="en-US"/>
           </a:p>
@@ -2070,7 +2070,7 @@
           <a:p>
             <a:fld id="{DE15D4B5-AEE3-42ED-9C3B-4D7A2F737357}" type="datetimeFigureOut">
               <a:rPr lang="ko-KR" altLang="en-US" smtClean="0"/>
-              <a:t>2021-04-25</a:t>
+              <a:t>2021-11-30</a:t>
             </a:fld>
             <a:endParaRPr lang="ko-KR" altLang="en-US"/>
           </a:p>
@@ -2381,7 +2381,7 @@
           <a:p>
             <a:fld id="{DE15D4B5-AEE3-42ED-9C3B-4D7A2F737357}" type="datetimeFigureOut">
               <a:rPr lang="ko-KR" altLang="en-US" smtClean="0"/>
-              <a:t>2021-04-25</a:t>
+              <a:t>2021-11-30</a:t>
             </a:fld>
             <a:endParaRPr lang="ko-KR" altLang="en-US"/>
           </a:p>
@@ -2669,7 +2669,7 @@
           <a:p>
             <a:fld id="{DE15D4B5-AEE3-42ED-9C3B-4D7A2F737357}" type="datetimeFigureOut">
               <a:rPr lang="ko-KR" altLang="en-US" smtClean="0"/>
-              <a:t>2021-04-25</a:t>
+              <a:t>2021-11-30</a:t>
             </a:fld>
             <a:endParaRPr lang="ko-KR" altLang="en-US"/>
           </a:p>
@@ -2910,7 +2910,7 @@
           <a:p>
             <a:fld id="{DE15D4B5-AEE3-42ED-9C3B-4D7A2F737357}" type="datetimeFigureOut">
               <a:rPr lang="ko-KR" altLang="en-US" smtClean="0"/>
-              <a:t>2021-04-25</a:t>
+              <a:t>2021-11-30</a:t>
             </a:fld>
             <a:endParaRPr lang="ko-KR" altLang="en-US"/>
           </a:p>
@@ -3329,10 +3329,10 @@
       </p:grpSpPr>
       <p:pic>
         <p:nvPicPr>
-          <p:cNvPr id="5" name="그림 4">
-            <a:extLst>
-              <a:ext uri="{FF2B5EF4-FFF2-40B4-BE49-F238E27FC236}">
-                <a16:creationId xmlns:a16="http://schemas.microsoft.com/office/drawing/2014/main" id="{2BA6498A-4DD3-4DD0-A2C1-19873288B385}"/>
+          <p:cNvPr id="3" name="그림 2">
+            <a:extLst>
+              <a:ext uri="{FF2B5EF4-FFF2-40B4-BE49-F238E27FC236}">
+                <a16:creationId xmlns:a16="http://schemas.microsoft.com/office/drawing/2014/main" id="{FDFAE793-CD43-41A9-A4CA-436E3B952304}"/>
               </a:ext>
             </a:extLst>
           </p:cNvPr>
@@ -3349,8 +3349,8 @@
         </p:blipFill>
         <p:spPr>
           <a:xfrm>
-            <a:off x="585565" y="1727925"/>
-            <a:ext cx="5826017" cy="2920654"/>
+            <a:off x="234916" y="1108695"/>
+            <a:ext cx="5840391" cy="1471475"/>
           </a:xfrm>
           <a:prstGeom prst="rect">
             <a:avLst/>
@@ -3371,8 +3371,8 @@
         </p:nvSpPr>
         <p:spPr>
           <a:xfrm>
-            <a:off x="572864" y="1727925"/>
-            <a:ext cx="5859410" cy="507827"/>
+            <a:off x="263665" y="1108314"/>
+            <a:ext cx="1433076" cy="249065"/>
           </a:xfrm>
           <a:prstGeom prst="rect">
             <a:avLst/>
@@ -3425,8 +3425,8 @@
         </p:nvSpPr>
         <p:spPr>
           <a:xfrm>
-            <a:off x="572864" y="2235753"/>
-            <a:ext cx="1449336" cy="241299"/>
+            <a:off x="3142912" y="1357952"/>
+            <a:ext cx="2876716" cy="241299"/>
           </a:xfrm>
           <a:prstGeom prst="rect">
             <a:avLst/>
@@ -3467,10 +3467,10 @@
       </p:sp>
       <p:sp>
         <p:nvSpPr>
-          <p:cNvPr id="9" name="직사각형 8">
-            <a:extLst>
-              <a:ext uri="{FF2B5EF4-FFF2-40B4-BE49-F238E27FC236}">
-                <a16:creationId xmlns:a16="http://schemas.microsoft.com/office/drawing/2014/main" id="{527FDFD8-BF2D-4678-AC31-5F72BEE3418A}"/>
+          <p:cNvPr id="22" name="직사각형 21">
+            <a:extLst>
+              <a:ext uri="{FF2B5EF4-FFF2-40B4-BE49-F238E27FC236}">
+                <a16:creationId xmlns:a16="http://schemas.microsoft.com/office/drawing/2014/main" id="{A44FEE43-3150-463F-8074-7A0D3CEE62A6}"/>
               </a:ext>
             </a:extLst>
           </p:cNvPr>
@@ -3479,17 +3479,16 @@
         </p:nvSpPr>
         <p:spPr>
           <a:xfrm>
-            <a:off x="2022200" y="2235753"/>
-            <a:ext cx="2919412" cy="241299"/>
+            <a:off x="6201122" y="2553949"/>
+            <a:ext cx="5755962" cy="1369579"/>
           </a:xfrm>
           <a:prstGeom prst="rect">
             <a:avLst/>
           </a:prstGeom>
           <a:solidFill>
-            <a:schemeClr val="bg2">
-              <a:lumMod val="25000"/>
+            <a:srgbClr val="92D050">
               <a:alpha val="56000"/>
-            </a:schemeClr>
+            </a:srgbClr>
           </a:solidFill>
           <a:ln>
             <a:noFill/>
@@ -3516,16 +3515,28 @@
           <a:lstStyle/>
           <a:p>
             <a:pPr algn="ctr"/>
-            <a:endParaRPr lang="ko-KR" altLang="en-US" dirty="0"/>
-          </a:p>
-        </p:txBody>
-      </p:sp>
-      <p:sp>
-        <p:nvSpPr>
-          <p:cNvPr id="10" name="직사각형 9">
-            <a:extLst>
-              <a:ext uri="{FF2B5EF4-FFF2-40B4-BE49-F238E27FC236}">
-                <a16:creationId xmlns:a16="http://schemas.microsoft.com/office/drawing/2014/main" id="{E773112D-713A-4D6D-8C77-E5C38615EB88}"/>
+            <a:r>
+              <a:rPr lang="en-US" altLang="ko-KR" sz="1400" dirty="0">
+                <a:solidFill>
+                  <a:schemeClr val="tx1"/>
+                </a:solidFill>
+              </a:rPr>
+              <a:t>File Contents</a:t>
+            </a:r>
+            <a:endParaRPr lang="ko-KR" altLang="en-US" sz="1400" dirty="0">
+              <a:solidFill>
+                <a:schemeClr val="tx1"/>
+              </a:solidFill>
+            </a:endParaRPr>
+          </a:p>
+        </p:txBody>
+      </p:sp>
+      <p:sp>
+        <p:nvSpPr>
+          <p:cNvPr id="14" name="직사각형 13">
+            <a:extLst>
+              <a:ext uri="{FF2B5EF4-FFF2-40B4-BE49-F238E27FC236}">
+                <a16:creationId xmlns:a16="http://schemas.microsoft.com/office/drawing/2014/main" id="{7AE181E9-830A-4B77-B7F8-1A0A5C27827D}"/>
               </a:ext>
             </a:extLst>
           </p:cNvPr>
@@ -3534,8 +3545,332 @@
         </p:nvSpPr>
         <p:spPr>
           <a:xfrm>
-            <a:off x="4941612" y="2235753"/>
-            <a:ext cx="1490662" cy="241299"/>
+            <a:off x="1696741" y="1107652"/>
+            <a:ext cx="1447451" cy="253276"/>
+          </a:xfrm>
+          <a:prstGeom prst="rect">
+            <a:avLst/>
+          </a:prstGeom>
+          <a:solidFill>
+            <a:srgbClr val="92D050">
+              <a:alpha val="56000"/>
+            </a:srgbClr>
+          </a:solidFill>
+          <a:ln>
+            <a:noFill/>
+          </a:ln>
+        </p:spPr>
+        <p:style>
+          <a:lnRef idx="2">
+            <a:schemeClr val="accent1">
+              <a:shade val="50000"/>
+            </a:schemeClr>
+          </a:lnRef>
+          <a:fillRef idx="1">
+            <a:schemeClr val="accent1"/>
+          </a:fillRef>
+          <a:effectRef idx="0">
+            <a:schemeClr val="accent1"/>
+          </a:effectRef>
+          <a:fontRef idx="minor">
+            <a:schemeClr val="lt1"/>
+          </a:fontRef>
+        </p:style>
+        <p:txBody>
+          <a:bodyPr rtlCol="0" anchor="ctr"/>
+          <a:lstStyle/>
+          <a:p>
+            <a:pPr algn="ctr"/>
+            <a:endParaRPr lang="ko-KR" altLang="en-US" dirty="0"/>
+          </a:p>
+        </p:txBody>
+      </p:sp>
+      <p:sp>
+        <p:nvSpPr>
+          <p:cNvPr id="15" name="직사각형 14">
+            <a:extLst>
+              <a:ext uri="{FF2B5EF4-FFF2-40B4-BE49-F238E27FC236}">
+                <a16:creationId xmlns:a16="http://schemas.microsoft.com/office/drawing/2014/main" id="{63483317-7DA9-4F3A-8AC8-6510CB4F0A7B}"/>
+              </a:ext>
+            </a:extLst>
+          </p:cNvPr>
+          <p:cNvSpPr/>
+          <p:nvPr/>
+        </p:nvSpPr>
+        <p:spPr>
+          <a:xfrm>
+            <a:off x="3144192" y="1106990"/>
+            <a:ext cx="2875435" cy="250962"/>
+          </a:xfrm>
+          <a:prstGeom prst="rect">
+            <a:avLst/>
+          </a:prstGeom>
+          <a:solidFill>
+            <a:srgbClr val="FF0000">
+              <a:alpha val="56000"/>
+            </a:srgbClr>
+          </a:solidFill>
+          <a:ln>
+            <a:noFill/>
+          </a:ln>
+        </p:spPr>
+        <p:style>
+          <a:lnRef idx="2">
+            <a:schemeClr val="accent1">
+              <a:shade val="50000"/>
+            </a:schemeClr>
+          </a:lnRef>
+          <a:fillRef idx="1">
+            <a:schemeClr val="accent1"/>
+          </a:fillRef>
+          <a:effectRef idx="0">
+            <a:schemeClr val="accent1"/>
+          </a:effectRef>
+          <a:fontRef idx="minor">
+            <a:schemeClr val="lt1"/>
+          </a:fontRef>
+        </p:style>
+        <p:txBody>
+          <a:bodyPr rtlCol="0" anchor="ctr"/>
+          <a:lstStyle/>
+          <a:p>
+            <a:pPr algn="ctr"/>
+            <a:endParaRPr lang="ko-KR" altLang="en-US" dirty="0"/>
+          </a:p>
+        </p:txBody>
+      </p:sp>
+      <p:sp>
+        <p:nvSpPr>
+          <p:cNvPr id="23" name="직사각형 22">
+            <a:extLst>
+              <a:ext uri="{FF2B5EF4-FFF2-40B4-BE49-F238E27FC236}">
+                <a16:creationId xmlns:a16="http://schemas.microsoft.com/office/drawing/2014/main" id="{063A9A0F-B8CD-49A0-BEB3-57D7CAE872D4}"/>
+              </a:ext>
+            </a:extLst>
+          </p:cNvPr>
+          <p:cNvSpPr/>
+          <p:nvPr/>
+        </p:nvSpPr>
+        <p:spPr>
+          <a:xfrm>
+            <a:off x="264306" y="1359149"/>
+            <a:ext cx="2879245" cy="241299"/>
+          </a:xfrm>
+          <a:prstGeom prst="rect">
+            <a:avLst/>
+          </a:prstGeom>
+          <a:solidFill>
+            <a:srgbClr val="7030A0">
+              <a:alpha val="56000"/>
+            </a:srgbClr>
+          </a:solidFill>
+          <a:ln>
+            <a:noFill/>
+          </a:ln>
+        </p:spPr>
+        <p:style>
+          <a:lnRef idx="2">
+            <a:schemeClr val="accent1">
+              <a:shade val="50000"/>
+            </a:schemeClr>
+          </a:lnRef>
+          <a:fillRef idx="1">
+            <a:schemeClr val="accent1"/>
+          </a:fillRef>
+          <a:effectRef idx="0">
+            <a:schemeClr val="accent1"/>
+          </a:effectRef>
+          <a:fontRef idx="minor">
+            <a:schemeClr val="lt1"/>
+          </a:fontRef>
+        </p:style>
+        <p:txBody>
+          <a:bodyPr rtlCol="0" anchor="ctr"/>
+          <a:lstStyle/>
+          <a:p>
+            <a:pPr algn="ctr"/>
+            <a:endParaRPr lang="ko-KR" altLang="en-US" dirty="0"/>
+          </a:p>
+        </p:txBody>
+      </p:sp>
+      <p:sp>
+        <p:nvSpPr>
+          <p:cNvPr id="31" name="직사각형 30">
+            <a:extLst>
+              <a:ext uri="{FF2B5EF4-FFF2-40B4-BE49-F238E27FC236}">
+                <a16:creationId xmlns:a16="http://schemas.microsoft.com/office/drawing/2014/main" id="{E18ED5ED-F492-4DBD-8E8A-E85933454B13}"/>
+              </a:ext>
+            </a:extLst>
+          </p:cNvPr>
+          <p:cNvSpPr/>
+          <p:nvPr/>
+        </p:nvSpPr>
+        <p:spPr>
+          <a:xfrm>
+            <a:off x="264306" y="1600448"/>
+            <a:ext cx="1440868" cy="240102"/>
+          </a:xfrm>
+          <a:prstGeom prst="rect">
+            <a:avLst/>
+          </a:prstGeom>
+          <a:solidFill>
+            <a:srgbClr val="92D050">
+              <a:alpha val="56000"/>
+            </a:srgbClr>
+          </a:solidFill>
+          <a:ln>
+            <a:noFill/>
+          </a:ln>
+        </p:spPr>
+        <p:style>
+          <a:lnRef idx="2">
+            <a:schemeClr val="accent1">
+              <a:shade val="50000"/>
+            </a:schemeClr>
+          </a:lnRef>
+          <a:fillRef idx="1">
+            <a:schemeClr val="accent1"/>
+          </a:fillRef>
+          <a:effectRef idx="0">
+            <a:schemeClr val="accent1"/>
+          </a:effectRef>
+          <a:fontRef idx="minor">
+            <a:schemeClr val="lt1"/>
+          </a:fontRef>
+        </p:style>
+        <p:txBody>
+          <a:bodyPr rtlCol="0" anchor="ctr"/>
+          <a:lstStyle/>
+          <a:p>
+            <a:pPr algn="ctr"/>
+            <a:endParaRPr lang="ko-KR" altLang="en-US" dirty="0"/>
+          </a:p>
+        </p:txBody>
+      </p:sp>
+      <p:sp>
+        <p:nvSpPr>
+          <p:cNvPr id="32" name="직사각형 31">
+            <a:extLst>
+              <a:ext uri="{FF2B5EF4-FFF2-40B4-BE49-F238E27FC236}">
+                <a16:creationId xmlns:a16="http://schemas.microsoft.com/office/drawing/2014/main" id="{D44891AE-247D-4D26-A0F7-09293D86D4C1}"/>
+              </a:ext>
+            </a:extLst>
+          </p:cNvPr>
+          <p:cNvSpPr/>
+          <p:nvPr/>
+        </p:nvSpPr>
+        <p:spPr>
+          <a:xfrm>
+            <a:off x="1704534" y="1601021"/>
+            <a:ext cx="1437736" cy="241299"/>
+          </a:xfrm>
+          <a:prstGeom prst="rect">
+            <a:avLst/>
+          </a:prstGeom>
+          <a:solidFill>
+            <a:schemeClr val="accent2">
+              <a:alpha val="56000"/>
+            </a:schemeClr>
+          </a:solidFill>
+          <a:ln>
+            <a:noFill/>
+          </a:ln>
+        </p:spPr>
+        <p:style>
+          <a:lnRef idx="2">
+            <a:schemeClr val="accent1">
+              <a:shade val="50000"/>
+            </a:schemeClr>
+          </a:lnRef>
+          <a:fillRef idx="1">
+            <a:schemeClr val="accent1"/>
+          </a:fillRef>
+          <a:effectRef idx="0">
+            <a:schemeClr val="accent1"/>
+          </a:effectRef>
+          <a:fontRef idx="minor">
+            <a:schemeClr val="lt1"/>
+          </a:fontRef>
+        </p:style>
+        <p:txBody>
+          <a:bodyPr rtlCol="0" anchor="ctr"/>
+          <a:lstStyle/>
+          <a:p>
+            <a:pPr algn="ctr"/>
+            <a:endParaRPr lang="ko-KR" altLang="en-US" dirty="0"/>
+          </a:p>
+        </p:txBody>
+      </p:sp>
+      <p:sp>
+        <p:nvSpPr>
+          <p:cNvPr id="33" name="직사각형 32">
+            <a:extLst>
+              <a:ext uri="{FF2B5EF4-FFF2-40B4-BE49-F238E27FC236}">
+                <a16:creationId xmlns:a16="http://schemas.microsoft.com/office/drawing/2014/main" id="{062A6BFB-33A9-4B20-B232-F52C72705032}"/>
+              </a:ext>
+            </a:extLst>
+          </p:cNvPr>
+          <p:cNvSpPr/>
+          <p:nvPr/>
+        </p:nvSpPr>
+        <p:spPr>
+          <a:xfrm>
+            <a:off x="3142270" y="1599251"/>
+            <a:ext cx="2877357" cy="241299"/>
+          </a:xfrm>
+          <a:prstGeom prst="rect">
+            <a:avLst/>
+          </a:prstGeom>
+          <a:solidFill>
+            <a:srgbClr val="92D050">
+              <a:alpha val="56000"/>
+            </a:srgbClr>
+          </a:solidFill>
+          <a:ln>
+            <a:noFill/>
+          </a:ln>
+        </p:spPr>
+        <p:style>
+          <a:lnRef idx="2">
+            <a:schemeClr val="accent1">
+              <a:shade val="50000"/>
+            </a:schemeClr>
+          </a:lnRef>
+          <a:fillRef idx="1">
+            <a:schemeClr val="accent1"/>
+          </a:fillRef>
+          <a:effectRef idx="0">
+            <a:schemeClr val="accent1"/>
+          </a:effectRef>
+          <a:fontRef idx="minor">
+            <a:schemeClr val="lt1"/>
+          </a:fontRef>
+        </p:style>
+        <p:txBody>
+          <a:bodyPr rtlCol="0" anchor="ctr"/>
+          <a:lstStyle/>
+          <a:p>
+            <a:pPr algn="ctr"/>
+            <a:endParaRPr lang="ko-KR" altLang="en-US" dirty="0"/>
+          </a:p>
+        </p:txBody>
+      </p:sp>
+      <p:sp>
+        <p:nvSpPr>
+          <p:cNvPr id="34" name="직사각형 33">
+            <a:extLst>
+              <a:ext uri="{FF2B5EF4-FFF2-40B4-BE49-F238E27FC236}">
+                <a16:creationId xmlns:a16="http://schemas.microsoft.com/office/drawing/2014/main" id="{3BC32216-B2A1-4691-A1EC-1B61BC32DC4B}"/>
+              </a:ext>
+            </a:extLst>
+          </p:cNvPr>
+          <p:cNvSpPr/>
+          <p:nvPr/>
+        </p:nvSpPr>
+        <p:spPr>
+          <a:xfrm>
+            <a:off x="263665" y="1839955"/>
+            <a:ext cx="5755962" cy="711234"/>
           </a:xfrm>
           <a:prstGeom prst="rect">
             <a:avLst/>
@@ -3576,10 +3911,10 @@
       </p:sp>
       <p:sp>
         <p:nvSpPr>
-          <p:cNvPr id="11" name="직사각형 10">
-            <a:extLst>
-              <a:ext uri="{FF2B5EF4-FFF2-40B4-BE49-F238E27FC236}">
-                <a16:creationId xmlns:a16="http://schemas.microsoft.com/office/drawing/2014/main" id="{37D417E0-6DD5-4002-97F5-EC6C8FABD6B1}"/>
+          <p:cNvPr id="36" name="직사각형 35">
+            <a:extLst>
+              <a:ext uri="{FF2B5EF4-FFF2-40B4-BE49-F238E27FC236}">
+                <a16:creationId xmlns:a16="http://schemas.microsoft.com/office/drawing/2014/main" id="{AE1B2C00-8B36-4108-ADD4-A18B7EC8C056}"/>
               </a:ext>
             </a:extLst>
           </p:cNvPr>
@@ -3588,8 +3923,536 @@
         </p:nvSpPr>
         <p:spPr>
           <a:xfrm>
-            <a:off x="572864" y="2477052"/>
-            <a:ext cx="5859410" cy="2171527"/>
+            <a:off x="6201122" y="1108314"/>
+            <a:ext cx="1433076" cy="249065"/>
+          </a:xfrm>
+          <a:prstGeom prst="rect">
+            <a:avLst/>
+          </a:prstGeom>
+          <a:solidFill>
+            <a:schemeClr val="accent1">
+              <a:alpha val="56000"/>
+            </a:schemeClr>
+          </a:solidFill>
+          <a:ln>
+            <a:noFill/>
+          </a:ln>
+        </p:spPr>
+        <p:style>
+          <a:lnRef idx="2">
+            <a:schemeClr val="accent1">
+              <a:shade val="50000"/>
+            </a:schemeClr>
+          </a:lnRef>
+          <a:fillRef idx="1">
+            <a:schemeClr val="accent1"/>
+          </a:fillRef>
+          <a:effectRef idx="0">
+            <a:schemeClr val="accent1"/>
+          </a:effectRef>
+          <a:fontRef idx="minor">
+            <a:schemeClr val="lt1"/>
+          </a:fontRef>
+        </p:style>
+        <p:txBody>
+          <a:bodyPr rtlCol="0" anchor="ctr"/>
+          <a:lstStyle/>
+          <a:p>
+            <a:pPr algn="ctr"/>
+            <a:r>
+              <a:rPr lang="en-US" altLang="ko-KR" sz="1400" dirty="0">
+                <a:solidFill>
+                  <a:schemeClr val="tx1"/>
+                </a:solidFill>
+              </a:rPr>
+              <a:t>ID</a:t>
+            </a:r>
+            <a:endParaRPr lang="ko-KR" altLang="en-US" sz="1400" dirty="0">
+              <a:solidFill>
+                <a:schemeClr val="tx1"/>
+              </a:solidFill>
+            </a:endParaRPr>
+          </a:p>
+        </p:txBody>
+      </p:sp>
+      <p:sp>
+        <p:nvSpPr>
+          <p:cNvPr id="37" name="직사각형 36">
+            <a:extLst>
+              <a:ext uri="{FF2B5EF4-FFF2-40B4-BE49-F238E27FC236}">
+                <a16:creationId xmlns:a16="http://schemas.microsoft.com/office/drawing/2014/main" id="{2FCC8163-12D8-4B42-B900-3CA54B11165C}"/>
+              </a:ext>
+            </a:extLst>
+          </p:cNvPr>
+          <p:cNvSpPr/>
+          <p:nvPr/>
+        </p:nvSpPr>
+        <p:spPr>
+          <a:xfrm>
+            <a:off x="9080369" y="1357952"/>
+            <a:ext cx="2876716" cy="241299"/>
+          </a:xfrm>
+          <a:prstGeom prst="rect">
+            <a:avLst/>
+          </a:prstGeom>
+          <a:solidFill>
+            <a:schemeClr val="accent2">
+              <a:alpha val="56000"/>
+            </a:schemeClr>
+          </a:solidFill>
+          <a:ln>
+            <a:noFill/>
+          </a:ln>
+        </p:spPr>
+        <p:style>
+          <a:lnRef idx="2">
+            <a:schemeClr val="accent1">
+              <a:shade val="50000"/>
+            </a:schemeClr>
+          </a:lnRef>
+          <a:fillRef idx="1">
+            <a:schemeClr val="accent1"/>
+          </a:fillRef>
+          <a:effectRef idx="0">
+            <a:schemeClr val="accent1"/>
+          </a:effectRef>
+          <a:fontRef idx="minor">
+            <a:schemeClr val="lt1"/>
+          </a:fontRef>
+        </p:style>
+        <p:txBody>
+          <a:bodyPr rtlCol="0" anchor="ctr"/>
+          <a:lstStyle/>
+          <a:p>
+            <a:pPr algn="ctr"/>
+            <a:r>
+              <a:rPr lang="en-US" altLang="ko-KR" sz="1400" dirty="0">
+                <a:solidFill>
+                  <a:schemeClr val="tx1"/>
+                </a:solidFill>
+              </a:rPr>
+              <a:t>CTIME</a:t>
+            </a:r>
+            <a:endParaRPr lang="ko-KR" altLang="en-US" sz="1400" dirty="0">
+              <a:solidFill>
+                <a:schemeClr val="tx1"/>
+              </a:solidFill>
+            </a:endParaRPr>
+          </a:p>
+        </p:txBody>
+      </p:sp>
+      <p:sp>
+        <p:nvSpPr>
+          <p:cNvPr id="38" name="직사각형 37">
+            <a:extLst>
+              <a:ext uri="{FF2B5EF4-FFF2-40B4-BE49-F238E27FC236}">
+                <a16:creationId xmlns:a16="http://schemas.microsoft.com/office/drawing/2014/main" id="{F6304C9A-C642-4DAB-8D91-4E23C4B1B0EF}"/>
+              </a:ext>
+            </a:extLst>
+          </p:cNvPr>
+          <p:cNvSpPr/>
+          <p:nvPr/>
+        </p:nvSpPr>
+        <p:spPr>
+          <a:xfrm>
+            <a:off x="7634198" y="1107652"/>
+            <a:ext cx="1447451" cy="253276"/>
+          </a:xfrm>
+          <a:prstGeom prst="rect">
+            <a:avLst/>
+          </a:prstGeom>
+          <a:solidFill>
+            <a:srgbClr val="92D050">
+              <a:alpha val="56000"/>
+            </a:srgbClr>
+          </a:solidFill>
+          <a:ln>
+            <a:noFill/>
+          </a:ln>
+        </p:spPr>
+        <p:style>
+          <a:lnRef idx="2">
+            <a:schemeClr val="accent1">
+              <a:shade val="50000"/>
+            </a:schemeClr>
+          </a:lnRef>
+          <a:fillRef idx="1">
+            <a:schemeClr val="accent1"/>
+          </a:fillRef>
+          <a:effectRef idx="0">
+            <a:schemeClr val="accent1"/>
+          </a:effectRef>
+          <a:fontRef idx="minor">
+            <a:schemeClr val="lt1"/>
+          </a:fontRef>
+        </p:style>
+        <p:txBody>
+          <a:bodyPr rtlCol="0" anchor="ctr"/>
+          <a:lstStyle/>
+          <a:p>
+            <a:pPr algn="ctr"/>
+            <a:r>
+              <a:rPr lang="en-US" altLang="ko-KR" sz="1400" dirty="0">
+                <a:solidFill>
+                  <a:schemeClr val="tx1"/>
+                </a:solidFill>
+              </a:rPr>
+              <a:t>UNK1</a:t>
+            </a:r>
+            <a:endParaRPr lang="ko-KR" altLang="en-US" sz="1400" dirty="0">
+              <a:solidFill>
+                <a:schemeClr val="tx1"/>
+              </a:solidFill>
+            </a:endParaRPr>
+          </a:p>
+        </p:txBody>
+      </p:sp>
+      <p:sp>
+        <p:nvSpPr>
+          <p:cNvPr id="39" name="직사각형 38">
+            <a:extLst>
+              <a:ext uri="{FF2B5EF4-FFF2-40B4-BE49-F238E27FC236}">
+                <a16:creationId xmlns:a16="http://schemas.microsoft.com/office/drawing/2014/main" id="{7401D29E-62B9-49FC-8272-BC951724F239}"/>
+              </a:ext>
+            </a:extLst>
+          </p:cNvPr>
+          <p:cNvSpPr/>
+          <p:nvPr/>
+        </p:nvSpPr>
+        <p:spPr>
+          <a:xfrm>
+            <a:off x="9081649" y="1106990"/>
+            <a:ext cx="2875435" cy="250962"/>
+          </a:xfrm>
+          <a:prstGeom prst="rect">
+            <a:avLst/>
+          </a:prstGeom>
+          <a:solidFill>
+            <a:srgbClr val="FF0000">
+              <a:alpha val="56000"/>
+            </a:srgbClr>
+          </a:solidFill>
+          <a:ln>
+            <a:noFill/>
+          </a:ln>
+        </p:spPr>
+        <p:style>
+          <a:lnRef idx="2">
+            <a:schemeClr val="accent1">
+              <a:shade val="50000"/>
+            </a:schemeClr>
+          </a:lnRef>
+          <a:fillRef idx="1">
+            <a:schemeClr val="accent1"/>
+          </a:fillRef>
+          <a:effectRef idx="0">
+            <a:schemeClr val="accent1"/>
+          </a:effectRef>
+          <a:fontRef idx="minor">
+            <a:schemeClr val="lt1"/>
+          </a:fontRef>
+        </p:style>
+        <p:txBody>
+          <a:bodyPr rtlCol="0" anchor="ctr"/>
+          <a:lstStyle/>
+          <a:p>
+            <a:pPr algn="ctr"/>
+            <a:r>
+              <a:rPr lang="en-US" altLang="ko-KR" sz="1400" dirty="0">
+                <a:solidFill>
+                  <a:schemeClr val="tx1"/>
+                </a:solidFill>
+              </a:rPr>
+              <a:t>MTIME</a:t>
+            </a:r>
+            <a:endParaRPr lang="ko-KR" altLang="en-US" sz="1400" dirty="0">
+              <a:solidFill>
+                <a:schemeClr val="tx1"/>
+              </a:solidFill>
+            </a:endParaRPr>
+          </a:p>
+        </p:txBody>
+      </p:sp>
+      <p:sp>
+        <p:nvSpPr>
+          <p:cNvPr id="40" name="직사각형 39">
+            <a:extLst>
+              <a:ext uri="{FF2B5EF4-FFF2-40B4-BE49-F238E27FC236}">
+                <a16:creationId xmlns:a16="http://schemas.microsoft.com/office/drawing/2014/main" id="{C8AFB539-E0F7-4B99-A714-99FD372DD870}"/>
+              </a:ext>
+            </a:extLst>
+          </p:cNvPr>
+          <p:cNvSpPr/>
+          <p:nvPr/>
+        </p:nvSpPr>
+        <p:spPr>
+          <a:xfrm>
+            <a:off x="6201763" y="1359149"/>
+            <a:ext cx="2879245" cy="241299"/>
+          </a:xfrm>
+          <a:prstGeom prst="rect">
+            <a:avLst/>
+          </a:prstGeom>
+          <a:solidFill>
+            <a:srgbClr val="7030A0">
+              <a:alpha val="56000"/>
+            </a:srgbClr>
+          </a:solidFill>
+          <a:ln>
+            <a:noFill/>
+          </a:ln>
+        </p:spPr>
+        <p:style>
+          <a:lnRef idx="2">
+            <a:schemeClr val="accent1">
+              <a:shade val="50000"/>
+            </a:schemeClr>
+          </a:lnRef>
+          <a:fillRef idx="1">
+            <a:schemeClr val="accent1"/>
+          </a:fillRef>
+          <a:effectRef idx="0">
+            <a:schemeClr val="accent1"/>
+          </a:effectRef>
+          <a:fontRef idx="minor">
+            <a:schemeClr val="lt1"/>
+          </a:fontRef>
+        </p:style>
+        <p:txBody>
+          <a:bodyPr rtlCol="0" anchor="ctr"/>
+          <a:lstStyle/>
+          <a:p>
+            <a:pPr algn="ctr"/>
+            <a:r>
+              <a:rPr lang="en-US" altLang="ko-KR" sz="1400" dirty="0">
+                <a:solidFill>
+                  <a:schemeClr val="tx1"/>
+                </a:solidFill>
+              </a:rPr>
+              <a:t>ATIME</a:t>
+            </a:r>
+            <a:endParaRPr lang="ko-KR" altLang="en-US" sz="1400" dirty="0">
+              <a:solidFill>
+                <a:schemeClr val="tx1"/>
+              </a:solidFill>
+            </a:endParaRPr>
+          </a:p>
+        </p:txBody>
+      </p:sp>
+      <p:sp>
+        <p:nvSpPr>
+          <p:cNvPr id="41" name="직사각형 40">
+            <a:extLst>
+              <a:ext uri="{FF2B5EF4-FFF2-40B4-BE49-F238E27FC236}">
+                <a16:creationId xmlns:a16="http://schemas.microsoft.com/office/drawing/2014/main" id="{2035E67B-13EF-4FEC-90B4-F9CBF41C3CD5}"/>
+              </a:ext>
+            </a:extLst>
+          </p:cNvPr>
+          <p:cNvSpPr/>
+          <p:nvPr/>
+        </p:nvSpPr>
+        <p:spPr>
+          <a:xfrm>
+            <a:off x="6201763" y="1600448"/>
+            <a:ext cx="1440868" cy="240102"/>
+          </a:xfrm>
+          <a:prstGeom prst="rect">
+            <a:avLst/>
+          </a:prstGeom>
+          <a:solidFill>
+            <a:srgbClr val="92D050">
+              <a:alpha val="56000"/>
+            </a:srgbClr>
+          </a:solidFill>
+          <a:ln>
+            <a:noFill/>
+          </a:ln>
+        </p:spPr>
+        <p:style>
+          <a:lnRef idx="2">
+            <a:schemeClr val="accent1">
+              <a:shade val="50000"/>
+            </a:schemeClr>
+          </a:lnRef>
+          <a:fillRef idx="1">
+            <a:schemeClr val="accent1"/>
+          </a:fillRef>
+          <a:effectRef idx="0">
+            <a:schemeClr val="accent1"/>
+          </a:effectRef>
+          <a:fontRef idx="minor">
+            <a:schemeClr val="lt1"/>
+          </a:fontRef>
+        </p:style>
+        <p:txBody>
+          <a:bodyPr rtlCol="0" anchor="ctr"/>
+          <a:lstStyle/>
+          <a:p>
+            <a:pPr algn="ctr"/>
+            <a:r>
+              <a:rPr lang="en-US" altLang="ko-KR" sz="1400" dirty="0">
+                <a:solidFill>
+                  <a:schemeClr val="tx1"/>
+                </a:solidFill>
+              </a:rPr>
+              <a:t>UNK2</a:t>
+            </a:r>
+            <a:endParaRPr lang="ko-KR" altLang="en-US" sz="1400" dirty="0">
+              <a:solidFill>
+                <a:schemeClr val="tx1"/>
+              </a:solidFill>
+            </a:endParaRPr>
+          </a:p>
+        </p:txBody>
+      </p:sp>
+      <p:sp>
+        <p:nvSpPr>
+          <p:cNvPr id="42" name="직사각형 41">
+            <a:extLst>
+              <a:ext uri="{FF2B5EF4-FFF2-40B4-BE49-F238E27FC236}">
+                <a16:creationId xmlns:a16="http://schemas.microsoft.com/office/drawing/2014/main" id="{972722AB-8F48-4A72-A8EF-E1E2655A2D37}"/>
+              </a:ext>
+            </a:extLst>
+          </p:cNvPr>
+          <p:cNvSpPr/>
+          <p:nvPr/>
+        </p:nvSpPr>
+        <p:spPr>
+          <a:xfrm>
+            <a:off x="7641991" y="1601021"/>
+            <a:ext cx="1437736" cy="241299"/>
+          </a:xfrm>
+          <a:prstGeom prst="rect">
+            <a:avLst/>
+          </a:prstGeom>
+          <a:solidFill>
+            <a:schemeClr val="accent2">
+              <a:alpha val="56000"/>
+            </a:schemeClr>
+          </a:solidFill>
+          <a:ln>
+            <a:noFill/>
+          </a:ln>
+        </p:spPr>
+        <p:style>
+          <a:lnRef idx="2">
+            <a:schemeClr val="accent1">
+              <a:shade val="50000"/>
+            </a:schemeClr>
+          </a:lnRef>
+          <a:fillRef idx="1">
+            <a:schemeClr val="accent1"/>
+          </a:fillRef>
+          <a:effectRef idx="0">
+            <a:schemeClr val="accent1"/>
+          </a:effectRef>
+          <a:fontRef idx="minor">
+            <a:schemeClr val="lt1"/>
+          </a:fontRef>
+        </p:style>
+        <p:txBody>
+          <a:bodyPr rtlCol="0" anchor="ctr"/>
+          <a:lstStyle/>
+          <a:p>
+            <a:pPr algn="ctr"/>
+            <a:r>
+              <a:rPr lang="en-US" altLang="ko-KR" sz="1400" dirty="0">
+                <a:solidFill>
+                  <a:schemeClr val="tx1"/>
+                </a:solidFill>
+              </a:rPr>
+              <a:t>File Size</a:t>
+            </a:r>
+            <a:endParaRPr lang="ko-KR" altLang="en-US" sz="1400" dirty="0">
+              <a:solidFill>
+                <a:schemeClr val="tx1"/>
+              </a:solidFill>
+            </a:endParaRPr>
+          </a:p>
+        </p:txBody>
+      </p:sp>
+      <p:sp>
+        <p:nvSpPr>
+          <p:cNvPr id="43" name="직사각형 42">
+            <a:extLst>
+              <a:ext uri="{FF2B5EF4-FFF2-40B4-BE49-F238E27FC236}">
+                <a16:creationId xmlns:a16="http://schemas.microsoft.com/office/drawing/2014/main" id="{43B7AAAD-1945-4E1D-982E-9838E2A2D454}"/>
+              </a:ext>
+            </a:extLst>
+          </p:cNvPr>
+          <p:cNvSpPr/>
+          <p:nvPr/>
+        </p:nvSpPr>
+        <p:spPr>
+          <a:xfrm>
+            <a:off x="9079727" y="1599251"/>
+            <a:ext cx="2877357" cy="241299"/>
+          </a:xfrm>
+          <a:prstGeom prst="rect">
+            <a:avLst/>
+          </a:prstGeom>
+          <a:solidFill>
+            <a:srgbClr val="92D050">
+              <a:alpha val="56000"/>
+            </a:srgbClr>
+          </a:solidFill>
+          <a:ln>
+            <a:noFill/>
+          </a:ln>
+        </p:spPr>
+        <p:style>
+          <a:lnRef idx="2">
+            <a:schemeClr val="accent1">
+              <a:shade val="50000"/>
+            </a:schemeClr>
+          </a:lnRef>
+          <a:fillRef idx="1">
+            <a:schemeClr val="accent1"/>
+          </a:fillRef>
+          <a:effectRef idx="0">
+            <a:schemeClr val="accent1"/>
+          </a:effectRef>
+          <a:fontRef idx="minor">
+            <a:schemeClr val="lt1"/>
+          </a:fontRef>
+        </p:style>
+        <p:txBody>
+          <a:bodyPr rtlCol="0" anchor="ctr"/>
+          <a:lstStyle/>
+          <a:p>
+            <a:pPr algn="ctr"/>
+            <a:r>
+              <a:rPr lang="en-US" altLang="ko-KR" sz="1400" dirty="0">
+                <a:solidFill>
+                  <a:schemeClr val="tx1"/>
+                </a:solidFill>
+              </a:rPr>
+              <a:t>UNK3</a:t>
+            </a:r>
+            <a:endParaRPr lang="ko-KR" altLang="en-US" sz="1400" dirty="0">
+              <a:solidFill>
+                <a:schemeClr val="tx1"/>
+              </a:solidFill>
+            </a:endParaRPr>
+          </a:p>
+        </p:txBody>
+      </p:sp>
+      <p:sp>
+        <p:nvSpPr>
+          <p:cNvPr id="44" name="직사각형 43">
+            <a:extLst>
+              <a:ext uri="{FF2B5EF4-FFF2-40B4-BE49-F238E27FC236}">
+                <a16:creationId xmlns:a16="http://schemas.microsoft.com/office/drawing/2014/main" id="{D5CA5FB0-A7AB-4F12-95F1-422D4AB52AC2}"/>
+              </a:ext>
+            </a:extLst>
+          </p:cNvPr>
+          <p:cNvSpPr/>
+          <p:nvPr/>
+        </p:nvSpPr>
+        <p:spPr>
+          <a:xfrm>
+            <a:off x="6201122" y="1837574"/>
+            <a:ext cx="5755962" cy="711234"/>
           </a:xfrm>
           <a:prstGeom prst="rect">
             <a:avLst/>
@@ -3624,425 +4487,42 @@
           <a:lstStyle/>
           <a:p>
             <a:pPr algn="ctr"/>
-            <a:endParaRPr lang="ko-KR" altLang="en-US" dirty="0"/>
-          </a:p>
-        </p:txBody>
-      </p:sp>
-      <p:sp>
-        <p:nvSpPr>
-          <p:cNvPr id="17" name="직사각형 16">
-            <a:extLst>
-              <a:ext uri="{FF2B5EF4-FFF2-40B4-BE49-F238E27FC236}">
-                <a16:creationId xmlns:a16="http://schemas.microsoft.com/office/drawing/2014/main" id="{FA6CC37D-A16A-4BE2-B4A5-10617FD68E0B}"/>
-              </a:ext>
-            </a:extLst>
-          </p:cNvPr>
-          <p:cNvSpPr/>
-          <p:nvPr/>
-        </p:nvSpPr>
-        <p:spPr>
-          <a:xfrm>
-            <a:off x="6973664" y="1103810"/>
-            <a:ext cx="5859410" cy="507827"/>
-          </a:xfrm>
-          <a:prstGeom prst="rect">
-            <a:avLst/>
-          </a:prstGeom>
-          <a:solidFill>
-            <a:schemeClr val="accent1">
-              <a:alpha val="56000"/>
-            </a:schemeClr>
-          </a:solidFill>
-          <a:ln>
-            <a:noFill/>
-          </a:ln>
-        </p:spPr>
-        <p:style>
-          <a:lnRef idx="2">
-            <a:schemeClr val="accent1">
-              <a:shade val="50000"/>
-            </a:schemeClr>
-          </a:lnRef>
-          <a:fillRef idx="1">
-            <a:schemeClr val="accent1"/>
-          </a:fillRef>
-          <a:effectRef idx="0">
-            <a:schemeClr val="accent1"/>
-          </a:effectRef>
-          <a:fontRef idx="minor">
-            <a:schemeClr val="lt1"/>
-          </a:fontRef>
-        </p:style>
-        <p:txBody>
-          <a:bodyPr rtlCol="0" anchor="ctr"/>
-          <a:lstStyle/>
-          <a:p>
-            <a:pPr algn="ctr"/>
-            <a:r>
-              <a:rPr lang="en-US" altLang="ko-KR" sz="1600" dirty="0">
+            <a:r>
+              <a:rPr lang="en-US" altLang="ko-KR" sz="1400" dirty="0">
                 <a:solidFill>
                   <a:schemeClr val="tx1"/>
                 </a:solidFill>
               </a:rPr>
-              <a:t>Signature</a:t>
-            </a:r>
-          </a:p>
-          <a:p>
-            <a:pPr algn="ctr"/>
-            <a:r>
-              <a:rPr lang="en-US" altLang="ko-KR" sz="1600" dirty="0">
+              <a:t>Name </a:t>
+            </a:r>
+            <a:r>
+              <a:rPr lang="en-US" altLang="ko-KR" sz="1400" dirty="0" err="1">
                 <a:solidFill>
                   <a:schemeClr val="tx1"/>
                 </a:solidFill>
               </a:rPr>
-              <a:t>( 32 byte )</a:t>
-            </a:r>
-            <a:endParaRPr lang="ko-KR" altLang="en-US" sz="1600" dirty="0">
-              <a:solidFill>
-                <a:schemeClr val="tx1"/>
-              </a:solidFill>
-            </a:endParaRPr>
-          </a:p>
-        </p:txBody>
-      </p:sp>
-      <p:sp>
-        <p:nvSpPr>
-          <p:cNvPr id="18" name="직사각형 17">
-            <a:extLst>
-              <a:ext uri="{FF2B5EF4-FFF2-40B4-BE49-F238E27FC236}">
-                <a16:creationId xmlns:a16="http://schemas.microsoft.com/office/drawing/2014/main" id="{FD191D3E-4C2D-4864-AC29-D789EC597675}"/>
-              </a:ext>
-            </a:extLst>
-          </p:cNvPr>
-          <p:cNvSpPr/>
-          <p:nvPr/>
-        </p:nvSpPr>
-        <p:spPr>
-          <a:xfrm>
-            <a:off x="6973664" y="1611638"/>
-            <a:ext cx="1449336" cy="507827"/>
-          </a:xfrm>
-          <a:prstGeom prst="rect">
-            <a:avLst/>
-          </a:prstGeom>
-          <a:solidFill>
-            <a:schemeClr val="accent2">
-              <a:alpha val="56000"/>
-            </a:schemeClr>
-          </a:solidFill>
-          <a:ln>
-            <a:noFill/>
-          </a:ln>
-        </p:spPr>
-        <p:style>
-          <a:lnRef idx="2">
-            <a:schemeClr val="accent1">
-              <a:shade val="50000"/>
-            </a:schemeClr>
-          </a:lnRef>
-          <a:fillRef idx="1">
-            <a:schemeClr val="accent1"/>
-          </a:fillRef>
-          <a:effectRef idx="0">
-            <a:schemeClr val="accent1"/>
-          </a:effectRef>
-          <a:fontRef idx="minor">
-            <a:schemeClr val="lt1"/>
-          </a:fontRef>
-        </p:style>
-        <p:txBody>
-          <a:bodyPr rtlCol="0" anchor="ctr"/>
-          <a:lstStyle/>
-          <a:p>
-            <a:pPr algn="ctr"/>
-            <a:r>
-              <a:rPr lang="en-US" altLang="ko-KR" sz="1600" dirty="0">
+              <a:t>Buf</a:t>
+            </a:r>
+            <a:r>
+              <a:rPr lang="en-US" altLang="ko-KR" sz="1400" dirty="0">
                 <a:solidFill>
                   <a:schemeClr val="tx1"/>
                 </a:solidFill>
               </a:rPr>
-              <a:t>Size Of File</a:t>
+              <a:t> &lt;utf-16le&gt;</a:t>
             </a:r>
           </a:p>
           <a:p>
             <a:pPr algn="ctr"/>
             <a:r>
-              <a:rPr lang="en-US" altLang="ko-KR" sz="1600" dirty="0">
-                <a:solidFill>
-                  <a:schemeClr val="tx1"/>
-                </a:solidFill>
-              </a:rPr>
-              <a:t>4 byte</a:t>
-            </a:r>
-            <a:endParaRPr lang="ko-KR" altLang="en-US" sz="1600" dirty="0">
-              <a:solidFill>
-                <a:schemeClr val="tx1"/>
-              </a:solidFill>
-            </a:endParaRPr>
-          </a:p>
-        </p:txBody>
-      </p:sp>
-      <p:sp>
-        <p:nvSpPr>
-          <p:cNvPr id="19" name="직사각형 18">
-            <a:extLst>
-              <a:ext uri="{FF2B5EF4-FFF2-40B4-BE49-F238E27FC236}">
-                <a16:creationId xmlns:a16="http://schemas.microsoft.com/office/drawing/2014/main" id="{3904FCEB-8FE3-4993-9799-D801BAFE6D3A}"/>
-              </a:ext>
-            </a:extLst>
-          </p:cNvPr>
-          <p:cNvSpPr/>
-          <p:nvPr/>
-        </p:nvSpPr>
-        <p:spPr>
-          <a:xfrm>
-            <a:off x="8423000" y="1611638"/>
-            <a:ext cx="2919412" cy="507827"/>
-          </a:xfrm>
-          <a:prstGeom prst="rect">
-            <a:avLst/>
-          </a:prstGeom>
-          <a:solidFill>
-            <a:schemeClr val="bg2">
-              <a:lumMod val="25000"/>
-              <a:alpha val="56000"/>
-            </a:schemeClr>
-          </a:solidFill>
-          <a:ln>
-            <a:noFill/>
-          </a:ln>
-        </p:spPr>
-        <p:style>
-          <a:lnRef idx="2">
-            <a:schemeClr val="accent1">
-              <a:shade val="50000"/>
-            </a:schemeClr>
-          </a:lnRef>
-          <a:fillRef idx="1">
-            <a:schemeClr val="accent1"/>
-          </a:fillRef>
-          <a:effectRef idx="0">
-            <a:schemeClr val="accent1"/>
-          </a:effectRef>
-          <a:fontRef idx="minor">
-            <a:schemeClr val="lt1"/>
-          </a:fontRef>
-        </p:style>
-        <p:txBody>
-          <a:bodyPr rtlCol="0" anchor="ctr"/>
-          <a:lstStyle/>
-          <a:p>
-            <a:pPr algn="ctr"/>
-            <a:r>
-              <a:rPr lang="en-US" altLang="ko-KR" sz="1600" dirty="0" err="1">
-                <a:solidFill>
-                  <a:schemeClr val="tx1"/>
-                </a:solidFill>
-              </a:rPr>
-              <a:t>Padd</a:t>
-            </a:r>
-            <a:endParaRPr lang="ko-KR" altLang="en-US" sz="1600" dirty="0">
-              <a:solidFill>
-                <a:schemeClr val="tx1"/>
-              </a:solidFill>
-            </a:endParaRPr>
-          </a:p>
-        </p:txBody>
-      </p:sp>
-      <p:sp>
-        <p:nvSpPr>
-          <p:cNvPr id="20" name="직사각형 19">
-            <a:extLst>
-              <a:ext uri="{FF2B5EF4-FFF2-40B4-BE49-F238E27FC236}">
-                <a16:creationId xmlns:a16="http://schemas.microsoft.com/office/drawing/2014/main" id="{CF4A85D5-6FE2-4988-AFC0-23AD2385F667}"/>
-              </a:ext>
-            </a:extLst>
-          </p:cNvPr>
-          <p:cNvSpPr/>
-          <p:nvPr/>
-        </p:nvSpPr>
-        <p:spPr>
-          <a:xfrm>
-            <a:off x="11342412" y="1611638"/>
-            <a:ext cx="1490662" cy="507827"/>
-          </a:xfrm>
-          <a:prstGeom prst="rect">
-            <a:avLst/>
-          </a:prstGeom>
-          <a:solidFill>
-            <a:srgbClr val="FFC000">
-              <a:alpha val="56000"/>
-            </a:srgbClr>
-          </a:solidFill>
-          <a:ln>
-            <a:noFill/>
-          </a:ln>
-        </p:spPr>
-        <p:style>
-          <a:lnRef idx="2">
-            <a:schemeClr val="accent1">
-              <a:shade val="50000"/>
-            </a:schemeClr>
-          </a:lnRef>
-          <a:fillRef idx="1">
-            <a:schemeClr val="accent1"/>
-          </a:fillRef>
-          <a:effectRef idx="0">
-            <a:schemeClr val="accent1"/>
-          </a:effectRef>
-          <a:fontRef idx="minor">
-            <a:schemeClr val="lt1"/>
-          </a:fontRef>
-        </p:style>
-        <p:txBody>
-          <a:bodyPr rtlCol="0" anchor="ctr"/>
-          <a:lstStyle/>
-          <a:p>
-            <a:pPr algn="ctr"/>
-            <a:endParaRPr lang="ko-KR" altLang="en-US" sz="1600" dirty="0">
-              <a:solidFill>
-                <a:schemeClr val="tx1"/>
-              </a:solidFill>
-            </a:endParaRPr>
-          </a:p>
-        </p:txBody>
-      </p:sp>
-      <p:sp>
-        <p:nvSpPr>
-          <p:cNvPr id="21" name="직사각형 20">
-            <a:extLst>
-              <a:ext uri="{FF2B5EF4-FFF2-40B4-BE49-F238E27FC236}">
-                <a16:creationId xmlns:a16="http://schemas.microsoft.com/office/drawing/2014/main" id="{49E6DA66-DD8A-4F37-9673-4D8C70BFCB84}"/>
-              </a:ext>
-            </a:extLst>
-          </p:cNvPr>
-          <p:cNvSpPr/>
-          <p:nvPr/>
-        </p:nvSpPr>
-        <p:spPr>
-          <a:xfrm>
-            <a:off x="6973664" y="2119465"/>
-            <a:ext cx="5859410" cy="2171527"/>
-          </a:xfrm>
-          <a:prstGeom prst="rect">
-            <a:avLst/>
-          </a:prstGeom>
-          <a:solidFill>
-            <a:srgbClr val="FFC000">
-              <a:alpha val="56000"/>
-            </a:srgbClr>
-          </a:solidFill>
-          <a:ln>
-            <a:noFill/>
-          </a:ln>
-        </p:spPr>
-        <p:style>
-          <a:lnRef idx="2">
-            <a:schemeClr val="accent1">
-              <a:shade val="50000"/>
-            </a:schemeClr>
-          </a:lnRef>
-          <a:fillRef idx="1">
-            <a:schemeClr val="accent1"/>
-          </a:fillRef>
-          <a:effectRef idx="0">
-            <a:schemeClr val="accent1"/>
-          </a:effectRef>
-          <a:fontRef idx="minor">
-            <a:schemeClr val="lt1"/>
-          </a:fontRef>
-        </p:style>
-        <p:txBody>
-          <a:bodyPr rtlCol="0" anchor="ctr"/>
-          <a:lstStyle/>
-          <a:p>
-            <a:pPr algn="ctr"/>
-            <a:r>
-              <a:rPr lang="en-US" altLang="ko-KR" sz="1600" dirty="0">
-                <a:solidFill>
-                  <a:schemeClr val="tx1"/>
-                </a:solidFill>
-              </a:rPr>
-              <a:t>File Name &lt;utf-16le&gt;</a:t>
-            </a:r>
-          </a:p>
-          <a:p>
-            <a:pPr algn="ctr"/>
-            <a:r>
-              <a:rPr lang="en-US" altLang="ko-KR" sz="1600" dirty="0">
+              <a:rPr lang="en-US" altLang="ko-KR" sz="1400" dirty="0">
                 <a:solidFill>
                   <a:schemeClr val="tx1"/>
                 </a:solidFill>
               </a:rPr>
               <a:t>(548 byte)</a:t>
             </a:r>
-            <a:endParaRPr lang="ko-KR" altLang="en-US" sz="1600" dirty="0">
-              <a:solidFill>
-                <a:schemeClr val="tx1"/>
-              </a:solidFill>
-            </a:endParaRPr>
-          </a:p>
-        </p:txBody>
-      </p:sp>
-      <p:sp>
-        <p:nvSpPr>
-          <p:cNvPr id="22" name="직사각형 21">
-            <a:extLst>
-              <a:ext uri="{FF2B5EF4-FFF2-40B4-BE49-F238E27FC236}">
-                <a16:creationId xmlns:a16="http://schemas.microsoft.com/office/drawing/2014/main" id="{A44FEE43-3150-463F-8074-7A0D3CEE62A6}"/>
-              </a:ext>
-            </a:extLst>
-          </p:cNvPr>
-          <p:cNvSpPr/>
-          <p:nvPr/>
-        </p:nvSpPr>
-        <p:spPr>
-          <a:xfrm>
-            <a:off x="6973664" y="4290992"/>
-            <a:ext cx="5859410" cy="1369579"/>
-          </a:xfrm>
-          <a:prstGeom prst="rect">
-            <a:avLst/>
-          </a:prstGeom>
-          <a:solidFill>
-            <a:srgbClr val="92D050">
-              <a:alpha val="56000"/>
-            </a:srgbClr>
-          </a:solidFill>
-          <a:ln>
-            <a:noFill/>
-          </a:ln>
-        </p:spPr>
-        <p:style>
-          <a:lnRef idx="2">
-            <a:schemeClr val="accent1">
-              <a:shade val="50000"/>
-            </a:schemeClr>
-          </a:lnRef>
-          <a:fillRef idx="1">
-            <a:schemeClr val="accent1"/>
-          </a:fillRef>
-          <a:effectRef idx="0">
-            <a:schemeClr val="accent1"/>
-          </a:effectRef>
-          <a:fontRef idx="minor">
-            <a:schemeClr val="lt1"/>
-          </a:fontRef>
-        </p:style>
-        <p:txBody>
-          <a:bodyPr rtlCol="0" anchor="ctr"/>
-          <a:lstStyle/>
-          <a:p>
-            <a:pPr algn="ctr"/>
-            <a:r>
-              <a:rPr lang="en-US" altLang="ko-KR" sz="1600" dirty="0">
-                <a:solidFill>
-                  <a:schemeClr val="tx1"/>
-                </a:solidFill>
-              </a:rPr>
-              <a:t>File Contents</a:t>
-            </a:r>
-            <a:endParaRPr lang="ko-KR" altLang="en-US" sz="1600" dirty="0">
+            <a:endParaRPr lang="ko-KR" altLang="en-US" sz="1400" dirty="0">
               <a:solidFill>
                 <a:schemeClr val="tx1"/>
               </a:solidFill>
@@ -4082,10 +4562,10 @@
       </p:grpSpPr>
       <p:sp>
         <p:nvSpPr>
-          <p:cNvPr id="17" name="직사각형 16">
-            <a:extLst>
-              <a:ext uri="{FF2B5EF4-FFF2-40B4-BE49-F238E27FC236}">
-                <a16:creationId xmlns:a16="http://schemas.microsoft.com/office/drawing/2014/main" id="{FA6CC37D-A16A-4BE2-B4A5-10617FD68E0B}"/>
+          <p:cNvPr id="22" name="직사각형 21">
+            <a:extLst>
+              <a:ext uri="{FF2B5EF4-FFF2-40B4-BE49-F238E27FC236}">
+                <a16:creationId xmlns:a16="http://schemas.microsoft.com/office/drawing/2014/main" id="{A44FEE43-3150-463F-8074-7A0D3CEE62A6}"/>
               </a:ext>
             </a:extLst>
           </p:cNvPr>
@@ -4094,8 +4574,116 @@
         </p:nvSpPr>
         <p:spPr>
           <a:xfrm>
-            <a:off x="3051020" y="241818"/>
-            <a:ext cx="5859410" cy="507827"/>
+            <a:off x="3082081" y="4461350"/>
+            <a:ext cx="5755959" cy="1369579"/>
+          </a:xfrm>
+          <a:prstGeom prst="rect">
+            <a:avLst/>
+          </a:prstGeom>
+          <a:solidFill>
+            <a:srgbClr val="92D050">
+              <a:alpha val="56000"/>
+            </a:srgbClr>
+          </a:solidFill>
+          <a:ln>
+            <a:noFill/>
+          </a:ln>
+        </p:spPr>
+        <p:style>
+          <a:lnRef idx="2">
+            <a:schemeClr val="accent1">
+              <a:shade val="50000"/>
+            </a:schemeClr>
+          </a:lnRef>
+          <a:fillRef idx="1">
+            <a:schemeClr val="accent1"/>
+          </a:fillRef>
+          <a:effectRef idx="0">
+            <a:schemeClr val="accent1"/>
+          </a:effectRef>
+          <a:fontRef idx="minor">
+            <a:schemeClr val="lt1"/>
+          </a:fontRef>
+        </p:style>
+        <p:txBody>
+          <a:bodyPr rtlCol="0" anchor="ctr"/>
+          <a:lstStyle/>
+          <a:p>
+            <a:pPr algn="ctr"/>
+            <a:r>
+              <a:rPr lang="en-US" altLang="ko-KR" sz="1600" dirty="0">
+                <a:solidFill>
+                  <a:schemeClr val="tx1"/>
+                </a:solidFill>
+              </a:rPr>
+              <a:t>File Contents</a:t>
+            </a:r>
+            <a:endParaRPr lang="ko-KR" altLang="en-US" sz="1600" dirty="0">
+              <a:solidFill>
+                <a:schemeClr val="tx1"/>
+              </a:solidFill>
+            </a:endParaRPr>
+          </a:p>
+        </p:txBody>
+      </p:sp>
+      <p:cxnSp>
+        <p:nvCxnSpPr>
+          <p:cNvPr id="3" name="직선 연결선 2">
+            <a:extLst>
+              <a:ext uri="{FF2B5EF4-FFF2-40B4-BE49-F238E27FC236}">
+                <a16:creationId xmlns:a16="http://schemas.microsoft.com/office/drawing/2014/main" id="{3589C398-914D-4457-9051-A54CD13BAB07}"/>
+              </a:ext>
+            </a:extLst>
+          </p:cNvPr>
+          <p:cNvCxnSpPr/>
+          <p:nvPr/>
+        </p:nvCxnSpPr>
+        <p:spPr>
+          <a:xfrm>
+            <a:off x="5960062" y="3651313"/>
+            <a:ext cx="0" cy="590550"/>
+          </a:xfrm>
+          <a:prstGeom prst="line">
+            <a:avLst/>
+          </a:prstGeom>
+          <a:ln w="28575">
+            <a:solidFill>
+              <a:schemeClr val="tx1"/>
+            </a:solidFill>
+            <a:prstDash val="sysDot"/>
+          </a:ln>
+        </p:spPr>
+        <p:style>
+          <a:lnRef idx="1">
+            <a:schemeClr val="accent1"/>
+          </a:lnRef>
+          <a:fillRef idx="0">
+            <a:schemeClr val="accent1"/>
+          </a:fillRef>
+          <a:effectRef idx="0">
+            <a:schemeClr val="accent1"/>
+          </a:effectRef>
+          <a:fontRef idx="minor">
+            <a:schemeClr val="tx1"/>
+          </a:fontRef>
+        </p:style>
+      </p:cxnSp>
+      <p:sp>
+        <p:nvSpPr>
+          <p:cNvPr id="38" name="직사각형 37">
+            <a:extLst>
+              <a:ext uri="{FF2B5EF4-FFF2-40B4-BE49-F238E27FC236}">
+                <a16:creationId xmlns:a16="http://schemas.microsoft.com/office/drawing/2014/main" id="{0540B693-3F96-4997-958E-3800A7D36C5F}"/>
+              </a:ext>
+            </a:extLst>
+          </p:cNvPr>
+          <p:cNvSpPr/>
+          <p:nvPr/>
+        </p:nvSpPr>
+        <p:spPr>
+          <a:xfrm>
+            <a:off x="3082081" y="549514"/>
+            <a:ext cx="1433076" cy="249065"/>
           </a:xfrm>
           <a:prstGeom prst="rect">
             <a:avLst/>
@@ -4131,25 +4719,14 @@
           <a:p>
             <a:pPr algn="ctr"/>
             <a:r>
-              <a:rPr lang="en-US" altLang="ko-KR" sz="1600" dirty="0">
+              <a:rPr lang="en-US" altLang="ko-KR" sz="1400" dirty="0">
                 <a:solidFill>
                   <a:schemeClr val="tx1"/>
                 </a:solidFill>
               </a:rPr>
-              <a:t>Signature</a:t>
-            </a:r>
-          </a:p>
-          <a:p>
-            <a:pPr algn="ctr"/>
-            <a:r>
-              <a:rPr lang="en-US" altLang="ko-KR" sz="1600" dirty="0">
-                <a:solidFill>
-                  <a:schemeClr val="tx1"/>
-                </a:solidFill>
-              </a:rPr>
-              <a:t>( 32 byte )</a:t>
-            </a:r>
-            <a:endParaRPr lang="ko-KR" altLang="en-US" sz="1600" dirty="0">
+              <a:t>ID</a:t>
+            </a:r>
+            <a:endParaRPr lang="ko-KR" altLang="en-US" sz="1400" dirty="0">
               <a:solidFill>
                 <a:schemeClr val="tx1"/>
               </a:solidFill>
@@ -4159,10 +4736,10 @@
       </p:sp>
       <p:sp>
         <p:nvSpPr>
-          <p:cNvPr id="18" name="직사각형 17">
-            <a:extLst>
-              <a:ext uri="{FF2B5EF4-FFF2-40B4-BE49-F238E27FC236}">
-                <a16:creationId xmlns:a16="http://schemas.microsoft.com/office/drawing/2014/main" id="{FD191D3E-4C2D-4864-AC29-D789EC597675}"/>
+          <p:cNvPr id="39" name="직사각형 38">
+            <a:extLst>
+              <a:ext uri="{FF2B5EF4-FFF2-40B4-BE49-F238E27FC236}">
+                <a16:creationId xmlns:a16="http://schemas.microsoft.com/office/drawing/2014/main" id="{9F3C1F55-43D3-49E0-9FD9-3277888858F4}"/>
               </a:ext>
             </a:extLst>
           </p:cNvPr>
@@ -4171,8 +4748,8 @@
         </p:nvSpPr>
         <p:spPr>
           <a:xfrm>
-            <a:off x="3051020" y="749646"/>
-            <a:ext cx="1449336" cy="507827"/>
+            <a:off x="5961328" y="799152"/>
+            <a:ext cx="2876716" cy="241299"/>
           </a:xfrm>
           <a:prstGeom prst="rect">
             <a:avLst/>
@@ -4208,25 +4785,14 @@
           <a:p>
             <a:pPr algn="ctr"/>
             <a:r>
-              <a:rPr lang="en-US" altLang="ko-KR" sz="1600" dirty="0">
+              <a:rPr lang="en-US" altLang="ko-KR" sz="1400" dirty="0">
                 <a:solidFill>
                   <a:schemeClr val="tx1"/>
                 </a:solidFill>
               </a:rPr>
-              <a:t>Size Of File</a:t>
-            </a:r>
-          </a:p>
-          <a:p>
-            <a:pPr algn="ctr"/>
-            <a:r>
-              <a:rPr lang="en-US" altLang="ko-KR" sz="1600" dirty="0">
-                <a:solidFill>
-                  <a:schemeClr val="tx1"/>
-                </a:solidFill>
-              </a:rPr>
-              <a:t>4 byte</a:t>
-            </a:r>
-            <a:endParaRPr lang="ko-KR" altLang="en-US" sz="1600" dirty="0">
+              <a:t>CTIME</a:t>
+            </a:r>
+            <a:endParaRPr lang="ko-KR" altLang="en-US" sz="1400" dirty="0">
               <a:solidFill>
                 <a:schemeClr val="tx1"/>
               </a:solidFill>
@@ -4236,10 +4802,10 @@
       </p:sp>
       <p:sp>
         <p:nvSpPr>
-          <p:cNvPr id="19" name="직사각형 18">
-            <a:extLst>
-              <a:ext uri="{FF2B5EF4-FFF2-40B4-BE49-F238E27FC236}">
-                <a16:creationId xmlns:a16="http://schemas.microsoft.com/office/drawing/2014/main" id="{3904FCEB-8FE3-4993-9799-D801BAFE6D3A}"/>
+          <p:cNvPr id="40" name="직사각형 39">
+            <a:extLst>
+              <a:ext uri="{FF2B5EF4-FFF2-40B4-BE49-F238E27FC236}">
+                <a16:creationId xmlns:a16="http://schemas.microsoft.com/office/drawing/2014/main" id="{AAF84D31-ACEB-43E8-A364-FD2411311DCF}"/>
               </a:ext>
             </a:extLst>
           </p:cNvPr>
@@ -4248,17 +4814,16 @@
         </p:nvSpPr>
         <p:spPr>
           <a:xfrm>
-            <a:off x="4500356" y="749646"/>
-            <a:ext cx="2919412" cy="507827"/>
+            <a:off x="4515157" y="548852"/>
+            <a:ext cx="1447451" cy="253276"/>
           </a:xfrm>
           <a:prstGeom prst="rect">
             <a:avLst/>
           </a:prstGeom>
           <a:solidFill>
-            <a:schemeClr val="bg2">
-              <a:lumMod val="25000"/>
+            <a:srgbClr val="92D050">
               <a:alpha val="56000"/>
-            </a:schemeClr>
+            </a:srgbClr>
           </a:solidFill>
           <a:ln>
             <a:noFill/>
@@ -4286,14 +4851,14 @@
           <a:p>
             <a:pPr algn="ctr"/>
             <a:r>
-              <a:rPr lang="en-US" altLang="ko-KR" sz="1600" dirty="0" err="1">
+              <a:rPr lang="en-US" altLang="ko-KR" sz="1400" dirty="0">
                 <a:solidFill>
                   <a:schemeClr val="tx1"/>
                 </a:solidFill>
               </a:rPr>
-              <a:t>Padd</a:t>
-            </a:r>
-            <a:endParaRPr lang="ko-KR" altLang="en-US" sz="1600" dirty="0">
+              <a:t>UNK1</a:t>
+            </a:r>
+            <a:endParaRPr lang="ko-KR" altLang="en-US" sz="1400" dirty="0">
               <a:solidFill>
                 <a:schemeClr val="tx1"/>
               </a:solidFill>
@@ -4303,10 +4868,10 @@
       </p:sp>
       <p:sp>
         <p:nvSpPr>
-          <p:cNvPr id="20" name="직사각형 19">
-            <a:extLst>
-              <a:ext uri="{FF2B5EF4-FFF2-40B4-BE49-F238E27FC236}">
-                <a16:creationId xmlns:a16="http://schemas.microsoft.com/office/drawing/2014/main" id="{CF4A85D5-6FE2-4988-AFC0-23AD2385F667}"/>
+          <p:cNvPr id="41" name="직사각형 40">
+            <a:extLst>
+              <a:ext uri="{FF2B5EF4-FFF2-40B4-BE49-F238E27FC236}">
+                <a16:creationId xmlns:a16="http://schemas.microsoft.com/office/drawing/2014/main" id="{4527739B-47E7-4B17-9B8E-CDA462D7B176}"/>
               </a:ext>
             </a:extLst>
           </p:cNvPr>
@@ -4315,8 +4880,338 @@
         </p:nvSpPr>
         <p:spPr>
           <a:xfrm>
-            <a:off x="7419768" y="749646"/>
-            <a:ext cx="1490662" cy="507827"/>
+            <a:off x="5962608" y="548190"/>
+            <a:ext cx="2875435" cy="250962"/>
+          </a:xfrm>
+          <a:prstGeom prst="rect">
+            <a:avLst/>
+          </a:prstGeom>
+          <a:solidFill>
+            <a:srgbClr val="FF0000">
+              <a:alpha val="56000"/>
+            </a:srgbClr>
+          </a:solidFill>
+          <a:ln>
+            <a:noFill/>
+          </a:ln>
+        </p:spPr>
+        <p:style>
+          <a:lnRef idx="2">
+            <a:schemeClr val="accent1">
+              <a:shade val="50000"/>
+            </a:schemeClr>
+          </a:lnRef>
+          <a:fillRef idx="1">
+            <a:schemeClr val="accent1"/>
+          </a:fillRef>
+          <a:effectRef idx="0">
+            <a:schemeClr val="accent1"/>
+          </a:effectRef>
+          <a:fontRef idx="minor">
+            <a:schemeClr val="lt1"/>
+          </a:fontRef>
+        </p:style>
+        <p:txBody>
+          <a:bodyPr rtlCol="0" anchor="ctr"/>
+          <a:lstStyle/>
+          <a:p>
+            <a:pPr algn="ctr"/>
+            <a:r>
+              <a:rPr lang="en-US" altLang="ko-KR" sz="1400" dirty="0">
+                <a:solidFill>
+                  <a:schemeClr val="tx1"/>
+                </a:solidFill>
+              </a:rPr>
+              <a:t>MTIME</a:t>
+            </a:r>
+            <a:endParaRPr lang="ko-KR" altLang="en-US" sz="1400" dirty="0">
+              <a:solidFill>
+                <a:schemeClr val="tx1"/>
+              </a:solidFill>
+            </a:endParaRPr>
+          </a:p>
+        </p:txBody>
+      </p:sp>
+      <p:sp>
+        <p:nvSpPr>
+          <p:cNvPr id="42" name="직사각형 41">
+            <a:extLst>
+              <a:ext uri="{FF2B5EF4-FFF2-40B4-BE49-F238E27FC236}">
+                <a16:creationId xmlns:a16="http://schemas.microsoft.com/office/drawing/2014/main" id="{65DAB16E-A0FC-4B80-AE51-2CAF1F6D5B61}"/>
+              </a:ext>
+            </a:extLst>
+          </p:cNvPr>
+          <p:cNvSpPr/>
+          <p:nvPr/>
+        </p:nvSpPr>
+        <p:spPr>
+          <a:xfrm>
+            <a:off x="3082722" y="800349"/>
+            <a:ext cx="2879245" cy="241299"/>
+          </a:xfrm>
+          <a:prstGeom prst="rect">
+            <a:avLst/>
+          </a:prstGeom>
+          <a:solidFill>
+            <a:srgbClr val="7030A0">
+              <a:alpha val="56000"/>
+            </a:srgbClr>
+          </a:solidFill>
+          <a:ln>
+            <a:noFill/>
+          </a:ln>
+        </p:spPr>
+        <p:style>
+          <a:lnRef idx="2">
+            <a:schemeClr val="accent1">
+              <a:shade val="50000"/>
+            </a:schemeClr>
+          </a:lnRef>
+          <a:fillRef idx="1">
+            <a:schemeClr val="accent1"/>
+          </a:fillRef>
+          <a:effectRef idx="0">
+            <a:schemeClr val="accent1"/>
+          </a:effectRef>
+          <a:fontRef idx="minor">
+            <a:schemeClr val="lt1"/>
+          </a:fontRef>
+        </p:style>
+        <p:txBody>
+          <a:bodyPr rtlCol="0" anchor="ctr"/>
+          <a:lstStyle/>
+          <a:p>
+            <a:pPr algn="ctr"/>
+            <a:r>
+              <a:rPr lang="en-US" altLang="ko-KR" sz="1400" dirty="0">
+                <a:solidFill>
+                  <a:schemeClr val="tx1"/>
+                </a:solidFill>
+              </a:rPr>
+              <a:t>ATIME</a:t>
+            </a:r>
+            <a:endParaRPr lang="ko-KR" altLang="en-US" sz="1400" dirty="0">
+              <a:solidFill>
+                <a:schemeClr val="tx1"/>
+              </a:solidFill>
+            </a:endParaRPr>
+          </a:p>
+        </p:txBody>
+      </p:sp>
+      <p:sp>
+        <p:nvSpPr>
+          <p:cNvPr id="43" name="직사각형 42">
+            <a:extLst>
+              <a:ext uri="{FF2B5EF4-FFF2-40B4-BE49-F238E27FC236}">
+                <a16:creationId xmlns:a16="http://schemas.microsoft.com/office/drawing/2014/main" id="{DD7EB8DA-81FA-4847-9242-3129B6EC9114}"/>
+              </a:ext>
+            </a:extLst>
+          </p:cNvPr>
+          <p:cNvSpPr/>
+          <p:nvPr/>
+        </p:nvSpPr>
+        <p:spPr>
+          <a:xfrm>
+            <a:off x="3082722" y="1041648"/>
+            <a:ext cx="1440868" cy="240102"/>
+          </a:xfrm>
+          <a:prstGeom prst="rect">
+            <a:avLst/>
+          </a:prstGeom>
+          <a:solidFill>
+            <a:srgbClr val="92D050">
+              <a:alpha val="56000"/>
+            </a:srgbClr>
+          </a:solidFill>
+          <a:ln>
+            <a:noFill/>
+          </a:ln>
+        </p:spPr>
+        <p:style>
+          <a:lnRef idx="2">
+            <a:schemeClr val="accent1">
+              <a:shade val="50000"/>
+            </a:schemeClr>
+          </a:lnRef>
+          <a:fillRef idx="1">
+            <a:schemeClr val="accent1"/>
+          </a:fillRef>
+          <a:effectRef idx="0">
+            <a:schemeClr val="accent1"/>
+          </a:effectRef>
+          <a:fontRef idx="minor">
+            <a:schemeClr val="lt1"/>
+          </a:fontRef>
+        </p:style>
+        <p:txBody>
+          <a:bodyPr rtlCol="0" anchor="ctr"/>
+          <a:lstStyle/>
+          <a:p>
+            <a:pPr algn="ctr"/>
+            <a:r>
+              <a:rPr lang="en-US" altLang="ko-KR" sz="1400" dirty="0">
+                <a:solidFill>
+                  <a:schemeClr val="tx1"/>
+                </a:solidFill>
+              </a:rPr>
+              <a:t>UNK2</a:t>
+            </a:r>
+            <a:endParaRPr lang="ko-KR" altLang="en-US" sz="1400" dirty="0">
+              <a:solidFill>
+                <a:schemeClr val="tx1"/>
+              </a:solidFill>
+            </a:endParaRPr>
+          </a:p>
+        </p:txBody>
+      </p:sp>
+      <p:sp>
+        <p:nvSpPr>
+          <p:cNvPr id="44" name="직사각형 43">
+            <a:extLst>
+              <a:ext uri="{FF2B5EF4-FFF2-40B4-BE49-F238E27FC236}">
+                <a16:creationId xmlns:a16="http://schemas.microsoft.com/office/drawing/2014/main" id="{01773C09-68C7-4805-A1F0-51F3CAC94AAA}"/>
+              </a:ext>
+            </a:extLst>
+          </p:cNvPr>
+          <p:cNvSpPr/>
+          <p:nvPr/>
+        </p:nvSpPr>
+        <p:spPr>
+          <a:xfrm>
+            <a:off x="4522950" y="1042221"/>
+            <a:ext cx="1437736" cy="241299"/>
+          </a:xfrm>
+          <a:prstGeom prst="rect">
+            <a:avLst/>
+          </a:prstGeom>
+          <a:solidFill>
+            <a:schemeClr val="accent2">
+              <a:alpha val="56000"/>
+            </a:schemeClr>
+          </a:solidFill>
+          <a:ln>
+            <a:noFill/>
+          </a:ln>
+        </p:spPr>
+        <p:style>
+          <a:lnRef idx="2">
+            <a:schemeClr val="accent1">
+              <a:shade val="50000"/>
+            </a:schemeClr>
+          </a:lnRef>
+          <a:fillRef idx="1">
+            <a:schemeClr val="accent1"/>
+          </a:fillRef>
+          <a:effectRef idx="0">
+            <a:schemeClr val="accent1"/>
+          </a:effectRef>
+          <a:fontRef idx="minor">
+            <a:schemeClr val="lt1"/>
+          </a:fontRef>
+        </p:style>
+        <p:txBody>
+          <a:bodyPr rtlCol="0" anchor="ctr"/>
+          <a:lstStyle/>
+          <a:p>
+            <a:pPr algn="ctr"/>
+            <a:r>
+              <a:rPr lang="en-US" altLang="ko-KR" sz="1400" dirty="0">
+                <a:solidFill>
+                  <a:schemeClr val="tx1"/>
+                </a:solidFill>
+              </a:rPr>
+              <a:t>File Size</a:t>
+            </a:r>
+            <a:endParaRPr lang="ko-KR" altLang="en-US" sz="1400" dirty="0">
+              <a:solidFill>
+                <a:schemeClr val="tx1"/>
+              </a:solidFill>
+            </a:endParaRPr>
+          </a:p>
+        </p:txBody>
+      </p:sp>
+      <p:sp>
+        <p:nvSpPr>
+          <p:cNvPr id="45" name="직사각형 44">
+            <a:extLst>
+              <a:ext uri="{FF2B5EF4-FFF2-40B4-BE49-F238E27FC236}">
+                <a16:creationId xmlns:a16="http://schemas.microsoft.com/office/drawing/2014/main" id="{1D8CC901-FAED-4DBA-AE87-2F8DC6C198BE}"/>
+              </a:ext>
+            </a:extLst>
+          </p:cNvPr>
+          <p:cNvSpPr/>
+          <p:nvPr/>
+        </p:nvSpPr>
+        <p:spPr>
+          <a:xfrm>
+            <a:off x="5960686" y="1040451"/>
+            <a:ext cx="2877357" cy="241299"/>
+          </a:xfrm>
+          <a:prstGeom prst="rect">
+            <a:avLst/>
+          </a:prstGeom>
+          <a:solidFill>
+            <a:srgbClr val="92D050">
+              <a:alpha val="56000"/>
+            </a:srgbClr>
+          </a:solidFill>
+          <a:ln>
+            <a:noFill/>
+          </a:ln>
+        </p:spPr>
+        <p:style>
+          <a:lnRef idx="2">
+            <a:schemeClr val="accent1">
+              <a:shade val="50000"/>
+            </a:schemeClr>
+          </a:lnRef>
+          <a:fillRef idx="1">
+            <a:schemeClr val="accent1"/>
+          </a:fillRef>
+          <a:effectRef idx="0">
+            <a:schemeClr val="accent1"/>
+          </a:effectRef>
+          <a:fontRef idx="minor">
+            <a:schemeClr val="lt1"/>
+          </a:fontRef>
+        </p:style>
+        <p:txBody>
+          <a:bodyPr rtlCol="0" anchor="ctr"/>
+          <a:lstStyle/>
+          <a:p>
+            <a:pPr algn="ctr"/>
+            <a:r>
+              <a:rPr lang="en-US" altLang="ko-KR" sz="1400" dirty="0">
+                <a:solidFill>
+                  <a:schemeClr val="tx1"/>
+                </a:solidFill>
+              </a:rPr>
+              <a:t>UNK3</a:t>
+            </a:r>
+            <a:endParaRPr lang="ko-KR" altLang="en-US" sz="1400" dirty="0">
+              <a:solidFill>
+                <a:schemeClr val="tx1"/>
+              </a:solidFill>
+            </a:endParaRPr>
+          </a:p>
+        </p:txBody>
+      </p:sp>
+      <p:sp>
+        <p:nvSpPr>
+          <p:cNvPr id="46" name="직사각형 45">
+            <a:extLst>
+              <a:ext uri="{FF2B5EF4-FFF2-40B4-BE49-F238E27FC236}">
+                <a16:creationId xmlns:a16="http://schemas.microsoft.com/office/drawing/2014/main" id="{D1BF0CAC-BB08-4395-8ED7-14E1F0972161}"/>
+              </a:ext>
+            </a:extLst>
+          </p:cNvPr>
+          <p:cNvSpPr/>
+          <p:nvPr/>
+        </p:nvSpPr>
+        <p:spPr>
+          <a:xfrm>
+            <a:off x="3082081" y="1278774"/>
+            <a:ext cx="5755962" cy="711234"/>
           </a:xfrm>
           <a:prstGeom prst="rect">
             <a:avLst/>
@@ -4351,7 +5246,42 @@
           <a:lstStyle/>
           <a:p>
             <a:pPr algn="ctr"/>
-            <a:endParaRPr lang="ko-KR" altLang="en-US" sz="1600" dirty="0">
+            <a:r>
+              <a:rPr lang="en-US" altLang="ko-KR" sz="1400" dirty="0">
+                <a:solidFill>
+                  <a:schemeClr val="tx1"/>
+                </a:solidFill>
+              </a:rPr>
+              <a:t>Name </a:t>
+            </a:r>
+            <a:r>
+              <a:rPr lang="en-US" altLang="ko-KR" sz="1400" dirty="0" err="1">
+                <a:solidFill>
+                  <a:schemeClr val="tx1"/>
+                </a:solidFill>
+              </a:rPr>
+              <a:t>Buf</a:t>
+            </a:r>
+            <a:r>
+              <a:rPr lang="en-US" altLang="ko-KR" sz="1400" dirty="0">
+                <a:solidFill>
+                  <a:schemeClr val="tx1"/>
+                </a:solidFill>
+              </a:rPr>
+              <a:t> &lt;utf-16le&gt;</a:t>
+            </a:r>
+          </a:p>
+          <a:p>
+            <a:pPr algn="ctr"/>
+            <a:r>
+              <a:rPr lang="en-US" altLang="ko-KR" sz="1400" dirty="0">
+                <a:solidFill>
+                  <a:schemeClr val="tx1"/>
+                </a:solidFill>
+              </a:rPr>
+              <a:t>(548 byte)</a:t>
+            </a:r>
+            <a:endParaRPr lang="ko-KR" altLang="en-US" sz="1400" dirty="0">
               <a:solidFill>
                 <a:schemeClr val="tx1"/>
               </a:solidFill>
@@ -4361,10 +5291,10 @@
       </p:sp>
       <p:sp>
         <p:nvSpPr>
-          <p:cNvPr id="21" name="직사각형 20">
-            <a:extLst>
-              <a:ext uri="{FF2B5EF4-FFF2-40B4-BE49-F238E27FC236}">
-                <a16:creationId xmlns:a16="http://schemas.microsoft.com/office/drawing/2014/main" id="{49E6DA66-DD8A-4F37-9673-4D8C70BFCB84}"/>
+          <p:cNvPr id="47" name="직사각형 46">
+            <a:extLst>
+              <a:ext uri="{FF2B5EF4-FFF2-40B4-BE49-F238E27FC236}">
+                <a16:creationId xmlns:a16="http://schemas.microsoft.com/office/drawing/2014/main" id="{3F831D2D-C00B-464D-B834-B8D96CC7392E}"/>
               </a:ext>
             </a:extLst>
           </p:cNvPr>
@@ -4373,8 +5303,536 @@
         </p:nvSpPr>
         <p:spPr>
           <a:xfrm>
-            <a:off x="3051020" y="1257473"/>
-            <a:ext cx="5859410" cy="2171527"/>
+            <a:off x="3082081" y="1991332"/>
+            <a:ext cx="1433076" cy="249065"/>
+          </a:xfrm>
+          <a:prstGeom prst="rect">
+            <a:avLst/>
+          </a:prstGeom>
+          <a:solidFill>
+            <a:schemeClr val="accent1">
+              <a:alpha val="56000"/>
+            </a:schemeClr>
+          </a:solidFill>
+          <a:ln>
+            <a:noFill/>
+          </a:ln>
+        </p:spPr>
+        <p:style>
+          <a:lnRef idx="2">
+            <a:schemeClr val="accent1">
+              <a:shade val="50000"/>
+            </a:schemeClr>
+          </a:lnRef>
+          <a:fillRef idx="1">
+            <a:schemeClr val="accent1"/>
+          </a:fillRef>
+          <a:effectRef idx="0">
+            <a:schemeClr val="accent1"/>
+          </a:effectRef>
+          <a:fontRef idx="minor">
+            <a:schemeClr val="lt1"/>
+          </a:fontRef>
+        </p:style>
+        <p:txBody>
+          <a:bodyPr rtlCol="0" anchor="ctr"/>
+          <a:lstStyle/>
+          <a:p>
+            <a:pPr algn="ctr"/>
+            <a:r>
+              <a:rPr lang="en-US" altLang="ko-KR" sz="1400" dirty="0">
+                <a:solidFill>
+                  <a:schemeClr val="tx1"/>
+                </a:solidFill>
+              </a:rPr>
+              <a:t>ID</a:t>
+            </a:r>
+            <a:endParaRPr lang="ko-KR" altLang="en-US" sz="1400" dirty="0">
+              <a:solidFill>
+                <a:schemeClr val="tx1"/>
+              </a:solidFill>
+            </a:endParaRPr>
+          </a:p>
+        </p:txBody>
+      </p:sp>
+      <p:sp>
+        <p:nvSpPr>
+          <p:cNvPr id="48" name="직사각형 47">
+            <a:extLst>
+              <a:ext uri="{FF2B5EF4-FFF2-40B4-BE49-F238E27FC236}">
+                <a16:creationId xmlns:a16="http://schemas.microsoft.com/office/drawing/2014/main" id="{412F45D4-F640-43C6-9145-D0BDCC48A0C4}"/>
+              </a:ext>
+            </a:extLst>
+          </p:cNvPr>
+          <p:cNvSpPr/>
+          <p:nvPr/>
+        </p:nvSpPr>
+        <p:spPr>
+          <a:xfrm>
+            <a:off x="5961328" y="2240970"/>
+            <a:ext cx="2876716" cy="241299"/>
+          </a:xfrm>
+          <a:prstGeom prst="rect">
+            <a:avLst/>
+          </a:prstGeom>
+          <a:solidFill>
+            <a:schemeClr val="accent2">
+              <a:alpha val="56000"/>
+            </a:schemeClr>
+          </a:solidFill>
+          <a:ln>
+            <a:noFill/>
+          </a:ln>
+        </p:spPr>
+        <p:style>
+          <a:lnRef idx="2">
+            <a:schemeClr val="accent1">
+              <a:shade val="50000"/>
+            </a:schemeClr>
+          </a:lnRef>
+          <a:fillRef idx="1">
+            <a:schemeClr val="accent1"/>
+          </a:fillRef>
+          <a:effectRef idx="0">
+            <a:schemeClr val="accent1"/>
+          </a:effectRef>
+          <a:fontRef idx="minor">
+            <a:schemeClr val="lt1"/>
+          </a:fontRef>
+        </p:style>
+        <p:txBody>
+          <a:bodyPr rtlCol="0" anchor="ctr"/>
+          <a:lstStyle/>
+          <a:p>
+            <a:pPr algn="ctr"/>
+            <a:r>
+              <a:rPr lang="en-US" altLang="ko-KR" sz="1400" dirty="0">
+                <a:solidFill>
+                  <a:schemeClr val="tx1"/>
+                </a:solidFill>
+              </a:rPr>
+              <a:t>CTIME</a:t>
+            </a:r>
+            <a:endParaRPr lang="ko-KR" altLang="en-US" sz="1400" dirty="0">
+              <a:solidFill>
+                <a:schemeClr val="tx1"/>
+              </a:solidFill>
+            </a:endParaRPr>
+          </a:p>
+        </p:txBody>
+      </p:sp>
+      <p:sp>
+        <p:nvSpPr>
+          <p:cNvPr id="49" name="직사각형 48">
+            <a:extLst>
+              <a:ext uri="{FF2B5EF4-FFF2-40B4-BE49-F238E27FC236}">
+                <a16:creationId xmlns:a16="http://schemas.microsoft.com/office/drawing/2014/main" id="{4A4DD60F-F1C0-437E-82D5-B31DD658AFE0}"/>
+              </a:ext>
+            </a:extLst>
+          </p:cNvPr>
+          <p:cNvSpPr/>
+          <p:nvPr/>
+        </p:nvSpPr>
+        <p:spPr>
+          <a:xfrm>
+            <a:off x="4515157" y="1990670"/>
+            <a:ext cx="1447451" cy="253276"/>
+          </a:xfrm>
+          <a:prstGeom prst="rect">
+            <a:avLst/>
+          </a:prstGeom>
+          <a:solidFill>
+            <a:srgbClr val="92D050">
+              <a:alpha val="56000"/>
+            </a:srgbClr>
+          </a:solidFill>
+          <a:ln>
+            <a:noFill/>
+          </a:ln>
+        </p:spPr>
+        <p:style>
+          <a:lnRef idx="2">
+            <a:schemeClr val="accent1">
+              <a:shade val="50000"/>
+            </a:schemeClr>
+          </a:lnRef>
+          <a:fillRef idx="1">
+            <a:schemeClr val="accent1"/>
+          </a:fillRef>
+          <a:effectRef idx="0">
+            <a:schemeClr val="accent1"/>
+          </a:effectRef>
+          <a:fontRef idx="minor">
+            <a:schemeClr val="lt1"/>
+          </a:fontRef>
+        </p:style>
+        <p:txBody>
+          <a:bodyPr rtlCol="0" anchor="ctr"/>
+          <a:lstStyle/>
+          <a:p>
+            <a:pPr algn="ctr"/>
+            <a:r>
+              <a:rPr lang="en-US" altLang="ko-KR" sz="1400" dirty="0">
+                <a:solidFill>
+                  <a:schemeClr val="tx1"/>
+                </a:solidFill>
+              </a:rPr>
+              <a:t>UNK1</a:t>
+            </a:r>
+            <a:endParaRPr lang="ko-KR" altLang="en-US" sz="1400" dirty="0">
+              <a:solidFill>
+                <a:schemeClr val="tx1"/>
+              </a:solidFill>
+            </a:endParaRPr>
+          </a:p>
+        </p:txBody>
+      </p:sp>
+      <p:sp>
+        <p:nvSpPr>
+          <p:cNvPr id="50" name="직사각형 49">
+            <a:extLst>
+              <a:ext uri="{FF2B5EF4-FFF2-40B4-BE49-F238E27FC236}">
+                <a16:creationId xmlns:a16="http://schemas.microsoft.com/office/drawing/2014/main" id="{06D41560-D3AF-4295-8BF9-95368F025C66}"/>
+              </a:ext>
+            </a:extLst>
+          </p:cNvPr>
+          <p:cNvSpPr/>
+          <p:nvPr/>
+        </p:nvSpPr>
+        <p:spPr>
+          <a:xfrm>
+            <a:off x="5962608" y="1990008"/>
+            <a:ext cx="2875435" cy="250962"/>
+          </a:xfrm>
+          <a:prstGeom prst="rect">
+            <a:avLst/>
+          </a:prstGeom>
+          <a:solidFill>
+            <a:srgbClr val="FF0000">
+              <a:alpha val="56000"/>
+            </a:srgbClr>
+          </a:solidFill>
+          <a:ln>
+            <a:noFill/>
+          </a:ln>
+        </p:spPr>
+        <p:style>
+          <a:lnRef idx="2">
+            <a:schemeClr val="accent1">
+              <a:shade val="50000"/>
+            </a:schemeClr>
+          </a:lnRef>
+          <a:fillRef idx="1">
+            <a:schemeClr val="accent1"/>
+          </a:fillRef>
+          <a:effectRef idx="0">
+            <a:schemeClr val="accent1"/>
+          </a:effectRef>
+          <a:fontRef idx="minor">
+            <a:schemeClr val="lt1"/>
+          </a:fontRef>
+        </p:style>
+        <p:txBody>
+          <a:bodyPr rtlCol="0" anchor="ctr"/>
+          <a:lstStyle/>
+          <a:p>
+            <a:pPr algn="ctr"/>
+            <a:r>
+              <a:rPr lang="en-US" altLang="ko-KR" sz="1400" dirty="0">
+                <a:solidFill>
+                  <a:schemeClr val="tx1"/>
+                </a:solidFill>
+              </a:rPr>
+              <a:t>MTIME</a:t>
+            </a:r>
+            <a:endParaRPr lang="ko-KR" altLang="en-US" sz="1400" dirty="0">
+              <a:solidFill>
+                <a:schemeClr val="tx1"/>
+              </a:solidFill>
+            </a:endParaRPr>
+          </a:p>
+        </p:txBody>
+      </p:sp>
+      <p:sp>
+        <p:nvSpPr>
+          <p:cNvPr id="51" name="직사각형 50">
+            <a:extLst>
+              <a:ext uri="{FF2B5EF4-FFF2-40B4-BE49-F238E27FC236}">
+                <a16:creationId xmlns:a16="http://schemas.microsoft.com/office/drawing/2014/main" id="{D89C5C01-59ED-4095-A4A9-BC5B7B586FC3}"/>
+              </a:ext>
+            </a:extLst>
+          </p:cNvPr>
+          <p:cNvSpPr/>
+          <p:nvPr/>
+        </p:nvSpPr>
+        <p:spPr>
+          <a:xfrm>
+            <a:off x="3082722" y="2242167"/>
+            <a:ext cx="2879245" cy="241299"/>
+          </a:xfrm>
+          <a:prstGeom prst="rect">
+            <a:avLst/>
+          </a:prstGeom>
+          <a:solidFill>
+            <a:srgbClr val="7030A0">
+              <a:alpha val="56000"/>
+            </a:srgbClr>
+          </a:solidFill>
+          <a:ln>
+            <a:noFill/>
+          </a:ln>
+        </p:spPr>
+        <p:style>
+          <a:lnRef idx="2">
+            <a:schemeClr val="accent1">
+              <a:shade val="50000"/>
+            </a:schemeClr>
+          </a:lnRef>
+          <a:fillRef idx="1">
+            <a:schemeClr val="accent1"/>
+          </a:fillRef>
+          <a:effectRef idx="0">
+            <a:schemeClr val="accent1"/>
+          </a:effectRef>
+          <a:fontRef idx="minor">
+            <a:schemeClr val="lt1"/>
+          </a:fontRef>
+        </p:style>
+        <p:txBody>
+          <a:bodyPr rtlCol="0" anchor="ctr"/>
+          <a:lstStyle/>
+          <a:p>
+            <a:pPr algn="ctr"/>
+            <a:r>
+              <a:rPr lang="en-US" altLang="ko-KR" sz="1400" dirty="0">
+                <a:solidFill>
+                  <a:schemeClr val="tx1"/>
+                </a:solidFill>
+              </a:rPr>
+              <a:t>ATIME</a:t>
+            </a:r>
+            <a:endParaRPr lang="ko-KR" altLang="en-US" sz="1400" dirty="0">
+              <a:solidFill>
+                <a:schemeClr val="tx1"/>
+              </a:solidFill>
+            </a:endParaRPr>
+          </a:p>
+        </p:txBody>
+      </p:sp>
+      <p:sp>
+        <p:nvSpPr>
+          <p:cNvPr id="52" name="직사각형 51">
+            <a:extLst>
+              <a:ext uri="{FF2B5EF4-FFF2-40B4-BE49-F238E27FC236}">
+                <a16:creationId xmlns:a16="http://schemas.microsoft.com/office/drawing/2014/main" id="{824B2437-18EE-4DF9-936B-9995EC96A399}"/>
+              </a:ext>
+            </a:extLst>
+          </p:cNvPr>
+          <p:cNvSpPr/>
+          <p:nvPr/>
+        </p:nvSpPr>
+        <p:spPr>
+          <a:xfrm>
+            <a:off x="3082722" y="2483466"/>
+            <a:ext cx="1440868" cy="240102"/>
+          </a:xfrm>
+          <a:prstGeom prst="rect">
+            <a:avLst/>
+          </a:prstGeom>
+          <a:solidFill>
+            <a:srgbClr val="92D050">
+              <a:alpha val="56000"/>
+            </a:srgbClr>
+          </a:solidFill>
+          <a:ln>
+            <a:noFill/>
+          </a:ln>
+        </p:spPr>
+        <p:style>
+          <a:lnRef idx="2">
+            <a:schemeClr val="accent1">
+              <a:shade val="50000"/>
+            </a:schemeClr>
+          </a:lnRef>
+          <a:fillRef idx="1">
+            <a:schemeClr val="accent1"/>
+          </a:fillRef>
+          <a:effectRef idx="0">
+            <a:schemeClr val="accent1"/>
+          </a:effectRef>
+          <a:fontRef idx="minor">
+            <a:schemeClr val="lt1"/>
+          </a:fontRef>
+        </p:style>
+        <p:txBody>
+          <a:bodyPr rtlCol="0" anchor="ctr"/>
+          <a:lstStyle/>
+          <a:p>
+            <a:pPr algn="ctr"/>
+            <a:r>
+              <a:rPr lang="en-US" altLang="ko-KR" sz="1400" dirty="0">
+                <a:solidFill>
+                  <a:schemeClr val="tx1"/>
+                </a:solidFill>
+              </a:rPr>
+              <a:t>UNK2</a:t>
+            </a:r>
+            <a:endParaRPr lang="ko-KR" altLang="en-US" sz="1400" dirty="0">
+              <a:solidFill>
+                <a:schemeClr val="tx1"/>
+              </a:solidFill>
+            </a:endParaRPr>
+          </a:p>
+        </p:txBody>
+      </p:sp>
+      <p:sp>
+        <p:nvSpPr>
+          <p:cNvPr id="53" name="직사각형 52">
+            <a:extLst>
+              <a:ext uri="{FF2B5EF4-FFF2-40B4-BE49-F238E27FC236}">
+                <a16:creationId xmlns:a16="http://schemas.microsoft.com/office/drawing/2014/main" id="{9F821DEF-4D10-41C0-ADAC-FAC042527845}"/>
+              </a:ext>
+            </a:extLst>
+          </p:cNvPr>
+          <p:cNvSpPr/>
+          <p:nvPr/>
+        </p:nvSpPr>
+        <p:spPr>
+          <a:xfrm>
+            <a:off x="4522950" y="2484039"/>
+            <a:ext cx="1437736" cy="241299"/>
+          </a:xfrm>
+          <a:prstGeom prst="rect">
+            <a:avLst/>
+          </a:prstGeom>
+          <a:solidFill>
+            <a:schemeClr val="accent2">
+              <a:alpha val="56000"/>
+            </a:schemeClr>
+          </a:solidFill>
+          <a:ln>
+            <a:noFill/>
+          </a:ln>
+        </p:spPr>
+        <p:style>
+          <a:lnRef idx="2">
+            <a:schemeClr val="accent1">
+              <a:shade val="50000"/>
+            </a:schemeClr>
+          </a:lnRef>
+          <a:fillRef idx="1">
+            <a:schemeClr val="accent1"/>
+          </a:fillRef>
+          <a:effectRef idx="0">
+            <a:schemeClr val="accent1"/>
+          </a:effectRef>
+          <a:fontRef idx="minor">
+            <a:schemeClr val="lt1"/>
+          </a:fontRef>
+        </p:style>
+        <p:txBody>
+          <a:bodyPr rtlCol="0" anchor="ctr"/>
+          <a:lstStyle/>
+          <a:p>
+            <a:pPr algn="ctr"/>
+            <a:r>
+              <a:rPr lang="en-US" altLang="ko-KR" sz="1400" dirty="0">
+                <a:solidFill>
+                  <a:schemeClr val="tx1"/>
+                </a:solidFill>
+              </a:rPr>
+              <a:t>File Size</a:t>
+            </a:r>
+            <a:endParaRPr lang="ko-KR" altLang="en-US" sz="1400" dirty="0">
+              <a:solidFill>
+                <a:schemeClr val="tx1"/>
+              </a:solidFill>
+            </a:endParaRPr>
+          </a:p>
+        </p:txBody>
+      </p:sp>
+      <p:sp>
+        <p:nvSpPr>
+          <p:cNvPr id="54" name="직사각형 53">
+            <a:extLst>
+              <a:ext uri="{FF2B5EF4-FFF2-40B4-BE49-F238E27FC236}">
+                <a16:creationId xmlns:a16="http://schemas.microsoft.com/office/drawing/2014/main" id="{1D556B25-6DD6-4B0B-BEC7-FCD5A74E114D}"/>
+              </a:ext>
+            </a:extLst>
+          </p:cNvPr>
+          <p:cNvSpPr/>
+          <p:nvPr/>
+        </p:nvSpPr>
+        <p:spPr>
+          <a:xfrm>
+            <a:off x="5960686" y="2482269"/>
+            <a:ext cx="2877357" cy="241299"/>
+          </a:xfrm>
+          <a:prstGeom prst="rect">
+            <a:avLst/>
+          </a:prstGeom>
+          <a:solidFill>
+            <a:srgbClr val="92D050">
+              <a:alpha val="56000"/>
+            </a:srgbClr>
+          </a:solidFill>
+          <a:ln>
+            <a:noFill/>
+          </a:ln>
+        </p:spPr>
+        <p:style>
+          <a:lnRef idx="2">
+            <a:schemeClr val="accent1">
+              <a:shade val="50000"/>
+            </a:schemeClr>
+          </a:lnRef>
+          <a:fillRef idx="1">
+            <a:schemeClr val="accent1"/>
+          </a:fillRef>
+          <a:effectRef idx="0">
+            <a:schemeClr val="accent1"/>
+          </a:effectRef>
+          <a:fontRef idx="minor">
+            <a:schemeClr val="lt1"/>
+          </a:fontRef>
+        </p:style>
+        <p:txBody>
+          <a:bodyPr rtlCol="0" anchor="ctr"/>
+          <a:lstStyle/>
+          <a:p>
+            <a:pPr algn="ctr"/>
+            <a:r>
+              <a:rPr lang="en-US" altLang="ko-KR" sz="1400" dirty="0">
+                <a:solidFill>
+                  <a:schemeClr val="tx1"/>
+                </a:solidFill>
+              </a:rPr>
+              <a:t>UNK3</a:t>
+            </a:r>
+            <a:endParaRPr lang="ko-KR" altLang="en-US" sz="1400" dirty="0">
+              <a:solidFill>
+                <a:schemeClr val="tx1"/>
+              </a:solidFill>
+            </a:endParaRPr>
+          </a:p>
+        </p:txBody>
+      </p:sp>
+      <p:sp>
+        <p:nvSpPr>
+          <p:cNvPr id="55" name="직사각형 54">
+            <a:extLst>
+              <a:ext uri="{FF2B5EF4-FFF2-40B4-BE49-F238E27FC236}">
+                <a16:creationId xmlns:a16="http://schemas.microsoft.com/office/drawing/2014/main" id="{20519A49-2FCB-4C7D-9E36-343DDFC361A2}"/>
+              </a:ext>
+            </a:extLst>
+          </p:cNvPr>
+          <p:cNvSpPr/>
+          <p:nvPr/>
+        </p:nvSpPr>
+        <p:spPr>
+          <a:xfrm>
+            <a:off x="3082081" y="2720592"/>
+            <a:ext cx="5755962" cy="711234"/>
           </a:xfrm>
           <a:prstGeom prst="rect">
             <a:avLst/>
@@ -4410,25 +5868,41 @@
           <a:p>
             <a:pPr algn="ctr"/>
             <a:r>
-              <a:rPr lang="en-US" altLang="ko-KR" sz="1600" dirty="0">
+              <a:rPr lang="en-US" altLang="ko-KR" sz="1400" dirty="0">
                 <a:solidFill>
                   <a:schemeClr val="tx1"/>
                 </a:solidFill>
               </a:rPr>
-              <a:t>File Name &lt;utf-16le&gt;</a:t>
+              <a:t>Name </a:t>
+            </a:r>
+            <a:r>
+              <a:rPr lang="en-US" altLang="ko-KR" sz="1400" dirty="0" err="1">
+                <a:solidFill>
+                  <a:schemeClr val="tx1"/>
+                </a:solidFill>
+              </a:rPr>
+              <a:t>Buf</a:t>
+            </a:r>
+            <a:r>
+              <a:rPr lang="en-US" altLang="ko-KR" sz="1400" dirty="0">
+                <a:solidFill>
+                  <a:schemeClr val="tx1"/>
+                </a:solidFill>
+              </a:rPr>
+              <a:t> &lt;utf-16le&gt;</a:t>
             </a:r>
           </a:p>
           <a:p>
             <a:pPr algn="ctr"/>
             <a:r>
-              <a:rPr lang="en-US" altLang="ko-KR" sz="1600" dirty="0">
+              <a:rPr lang="en-US" altLang="ko-KR" sz="1400" dirty="0">
                 <a:solidFill>
                   <a:schemeClr val="tx1"/>
                 </a:solidFill>
               </a:rPr>
               <a:t>(548 byte)</a:t>
             </a:r>
-            <a:endParaRPr lang="ko-KR" altLang="en-US" sz="1600" dirty="0">
+            <a:endParaRPr lang="ko-KR" altLang="en-US" sz="1400" dirty="0">
               <a:solidFill>
                 <a:schemeClr val="tx1"/>
               </a:solidFill>
@@ -4438,10 +5912,10 @@
       </p:sp>
       <p:sp>
         <p:nvSpPr>
-          <p:cNvPr id="22" name="직사각형 21">
-            <a:extLst>
-              <a:ext uri="{FF2B5EF4-FFF2-40B4-BE49-F238E27FC236}">
-                <a16:creationId xmlns:a16="http://schemas.microsoft.com/office/drawing/2014/main" id="{A44FEE43-3150-463F-8074-7A0D3CEE62A6}"/>
+          <p:cNvPr id="56" name="직사각형 55">
+            <a:extLst>
+              <a:ext uri="{FF2B5EF4-FFF2-40B4-BE49-F238E27FC236}">
+                <a16:creationId xmlns:a16="http://schemas.microsoft.com/office/drawing/2014/main" id="{1E47D21E-F44F-489C-B5A6-75682D07642E}"/>
               </a:ext>
             </a:extLst>
           </p:cNvPr>
@@ -4450,17 +5924,13 @@
         </p:nvSpPr>
         <p:spPr>
           <a:xfrm>
-            <a:off x="3051020" y="7957068"/>
-            <a:ext cx="5859410" cy="1369579"/>
+            <a:off x="1617944" y="505037"/>
+            <a:ext cx="1433076" cy="249065"/>
           </a:xfrm>
           <a:prstGeom prst="rect">
             <a:avLst/>
           </a:prstGeom>
-          <a:solidFill>
-            <a:srgbClr val="92D050">
-              <a:alpha val="56000"/>
-            </a:srgbClr>
-          </a:solidFill>
+          <a:noFill/>
           <a:ln>
             <a:noFill/>
           </a:ln>
@@ -4487,14 +5957,14 @@
           <a:p>
             <a:pPr algn="ctr"/>
             <a:r>
-              <a:rPr lang="en-US" altLang="ko-KR" sz="1600" dirty="0">
+              <a:rPr lang="en-US" altLang="ko-KR" sz="1400" dirty="0">
                 <a:solidFill>
                   <a:schemeClr val="tx1"/>
                 </a:solidFill>
               </a:rPr>
-              <a:t>File Contents</a:t>
-            </a:r>
-            <a:endParaRPr lang="ko-KR" altLang="en-US" sz="1600" dirty="0">
+              <a:t>If ID == 0</a:t>
+            </a:r>
+            <a:endParaRPr lang="ko-KR" altLang="en-US" sz="1400" dirty="0">
               <a:solidFill>
                 <a:schemeClr val="tx1"/>
               </a:solidFill>
@@ -4502,404 +5972,6 @@
           </a:p>
         </p:txBody>
       </p:sp>
-      <p:sp>
-        <p:nvSpPr>
-          <p:cNvPr id="14" name="직사각형 13">
-            <a:extLst>
-              <a:ext uri="{FF2B5EF4-FFF2-40B4-BE49-F238E27FC236}">
-                <a16:creationId xmlns:a16="http://schemas.microsoft.com/office/drawing/2014/main" id="{E6949431-C753-4084-9FB1-B69867426F4B}"/>
-              </a:ext>
-            </a:extLst>
-          </p:cNvPr>
-          <p:cNvSpPr/>
-          <p:nvPr/>
-        </p:nvSpPr>
-        <p:spPr>
-          <a:xfrm>
-            <a:off x="3051020" y="3429000"/>
-            <a:ext cx="5859410" cy="507827"/>
-          </a:xfrm>
-          <a:prstGeom prst="rect">
-            <a:avLst/>
-          </a:prstGeom>
-          <a:solidFill>
-            <a:schemeClr val="accent1">
-              <a:alpha val="56000"/>
-            </a:schemeClr>
-          </a:solidFill>
-          <a:ln>
-            <a:noFill/>
-          </a:ln>
-        </p:spPr>
-        <p:style>
-          <a:lnRef idx="2">
-            <a:schemeClr val="accent1">
-              <a:shade val="50000"/>
-            </a:schemeClr>
-          </a:lnRef>
-          <a:fillRef idx="1">
-            <a:schemeClr val="accent1"/>
-          </a:fillRef>
-          <a:effectRef idx="0">
-            <a:schemeClr val="accent1"/>
-          </a:effectRef>
-          <a:fontRef idx="minor">
-            <a:schemeClr val="lt1"/>
-          </a:fontRef>
-        </p:style>
-        <p:txBody>
-          <a:bodyPr rtlCol="0" anchor="ctr"/>
-          <a:lstStyle/>
-          <a:p>
-            <a:pPr algn="ctr"/>
-            <a:r>
-              <a:rPr lang="en-US" altLang="ko-KR" sz="1600" dirty="0">
-                <a:solidFill>
-                  <a:schemeClr val="tx1"/>
-                </a:solidFill>
-              </a:rPr>
-              <a:t>Signature</a:t>
-            </a:r>
-          </a:p>
-          <a:p>
-            <a:pPr algn="ctr"/>
-            <a:r>
-              <a:rPr lang="en-US" altLang="ko-KR" sz="1600" dirty="0">
-                <a:solidFill>
-                  <a:schemeClr val="tx1"/>
-                </a:solidFill>
-              </a:rPr>
-              <a:t>( 32 byte )</a:t>
-            </a:r>
-            <a:endParaRPr lang="ko-KR" altLang="en-US" sz="1600" dirty="0">
-              <a:solidFill>
-                <a:schemeClr val="tx1"/>
-              </a:solidFill>
-            </a:endParaRPr>
-          </a:p>
-        </p:txBody>
-      </p:sp>
-      <p:sp>
-        <p:nvSpPr>
-          <p:cNvPr id="15" name="직사각형 14">
-            <a:extLst>
-              <a:ext uri="{FF2B5EF4-FFF2-40B4-BE49-F238E27FC236}">
-                <a16:creationId xmlns:a16="http://schemas.microsoft.com/office/drawing/2014/main" id="{B051BD9B-42AF-48E3-A5AD-8E6A05D7F080}"/>
-              </a:ext>
-            </a:extLst>
-          </p:cNvPr>
-          <p:cNvSpPr/>
-          <p:nvPr/>
-        </p:nvSpPr>
-        <p:spPr>
-          <a:xfrm>
-            <a:off x="3051020" y="3936828"/>
-            <a:ext cx="1449336" cy="507827"/>
-          </a:xfrm>
-          <a:prstGeom prst="rect">
-            <a:avLst/>
-          </a:prstGeom>
-          <a:solidFill>
-            <a:schemeClr val="accent2">
-              <a:alpha val="56000"/>
-            </a:schemeClr>
-          </a:solidFill>
-          <a:ln>
-            <a:noFill/>
-          </a:ln>
-        </p:spPr>
-        <p:style>
-          <a:lnRef idx="2">
-            <a:schemeClr val="accent1">
-              <a:shade val="50000"/>
-            </a:schemeClr>
-          </a:lnRef>
-          <a:fillRef idx="1">
-            <a:schemeClr val="accent1"/>
-          </a:fillRef>
-          <a:effectRef idx="0">
-            <a:schemeClr val="accent1"/>
-          </a:effectRef>
-          <a:fontRef idx="minor">
-            <a:schemeClr val="lt1"/>
-          </a:fontRef>
-        </p:style>
-        <p:txBody>
-          <a:bodyPr rtlCol="0" anchor="ctr"/>
-          <a:lstStyle/>
-          <a:p>
-            <a:pPr algn="ctr"/>
-            <a:r>
-              <a:rPr lang="en-US" altLang="ko-KR" sz="1600" dirty="0">
-                <a:solidFill>
-                  <a:schemeClr val="tx1"/>
-                </a:solidFill>
-              </a:rPr>
-              <a:t>Size Of File</a:t>
-            </a:r>
-          </a:p>
-          <a:p>
-            <a:pPr algn="ctr"/>
-            <a:r>
-              <a:rPr lang="en-US" altLang="ko-KR" sz="1600" dirty="0">
-                <a:solidFill>
-                  <a:schemeClr val="tx1"/>
-                </a:solidFill>
-              </a:rPr>
-              <a:t>4 byte</a:t>
-            </a:r>
-            <a:endParaRPr lang="ko-KR" altLang="en-US" sz="1600" dirty="0">
-              <a:solidFill>
-                <a:schemeClr val="tx1"/>
-              </a:solidFill>
-            </a:endParaRPr>
-          </a:p>
-        </p:txBody>
-      </p:sp>
-      <p:sp>
-        <p:nvSpPr>
-          <p:cNvPr id="16" name="직사각형 15">
-            <a:extLst>
-              <a:ext uri="{FF2B5EF4-FFF2-40B4-BE49-F238E27FC236}">
-                <a16:creationId xmlns:a16="http://schemas.microsoft.com/office/drawing/2014/main" id="{E8EC522B-1BDF-4996-81A8-6148B61EDE67}"/>
-              </a:ext>
-            </a:extLst>
-          </p:cNvPr>
-          <p:cNvSpPr/>
-          <p:nvPr/>
-        </p:nvSpPr>
-        <p:spPr>
-          <a:xfrm>
-            <a:off x="4500356" y="3936828"/>
-            <a:ext cx="2919412" cy="507827"/>
-          </a:xfrm>
-          <a:prstGeom prst="rect">
-            <a:avLst/>
-          </a:prstGeom>
-          <a:solidFill>
-            <a:schemeClr val="bg2">
-              <a:lumMod val="25000"/>
-              <a:alpha val="56000"/>
-            </a:schemeClr>
-          </a:solidFill>
-          <a:ln>
-            <a:noFill/>
-          </a:ln>
-        </p:spPr>
-        <p:style>
-          <a:lnRef idx="2">
-            <a:schemeClr val="accent1">
-              <a:shade val="50000"/>
-            </a:schemeClr>
-          </a:lnRef>
-          <a:fillRef idx="1">
-            <a:schemeClr val="accent1"/>
-          </a:fillRef>
-          <a:effectRef idx="0">
-            <a:schemeClr val="accent1"/>
-          </a:effectRef>
-          <a:fontRef idx="minor">
-            <a:schemeClr val="lt1"/>
-          </a:fontRef>
-        </p:style>
-        <p:txBody>
-          <a:bodyPr rtlCol="0" anchor="ctr"/>
-          <a:lstStyle/>
-          <a:p>
-            <a:pPr algn="ctr"/>
-            <a:r>
-              <a:rPr lang="en-US" altLang="ko-KR" sz="1600" dirty="0" err="1">
-                <a:solidFill>
-                  <a:schemeClr val="tx1"/>
-                </a:solidFill>
-              </a:rPr>
-              <a:t>Padd</a:t>
-            </a:r>
-            <a:endParaRPr lang="ko-KR" altLang="en-US" sz="1600" dirty="0">
-              <a:solidFill>
-                <a:schemeClr val="tx1"/>
-              </a:solidFill>
-            </a:endParaRPr>
-          </a:p>
-        </p:txBody>
-      </p:sp>
-      <p:sp>
-        <p:nvSpPr>
-          <p:cNvPr id="23" name="직사각형 22">
-            <a:extLst>
-              <a:ext uri="{FF2B5EF4-FFF2-40B4-BE49-F238E27FC236}">
-                <a16:creationId xmlns:a16="http://schemas.microsoft.com/office/drawing/2014/main" id="{A4D13C7A-7368-4756-9BB8-515B8DAD3BCC}"/>
-              </a:ext>
-            </a:extLst>
-          </p:cNvPr>
-          <p:cNvSpPr/>
-          <p:nvPr/>
-        </p:nvSpPr>
-        <p:spPr>
-          <a:xfrm>
-            <a:off x="7419768" y="3936828"/>
-            <a:ext cx="1490662" cy="507827"/>
-          </a:xfrm>
-          <a:prstGeom prst="rect">
-            <a:avLst/>
-          </a:prstGeom>
-          <a:solidFill>
-            <a:srgbClr val="FFC000">
-              <a:alpha val="56000"/>
-            </a:srgbClr>
-          </a:solidFill>
-          <a:ln>
-            <a:noFill/>
-          </a:ln>
-        </p:spPr>
-        <p:style>
-          <a:lnRef idx="2">
-            <a:schemeClr val="accent1">
-              <a:shade val="50000"/>
-            </a:schemeClr>
-          </a:lnRef>
-          <a:fillRef idx="1">
-            <a:schemeClr val="accent1"/>
-          </a:fillRef>
-          <a:effectRef idx="0">
-            <a:schemeClr val="accent1"/>
-          </a:effectRef>
-          <a:fontRef idx="minor">
-            <a:schemeClr val="lt1"/>
-          </a:fontRef>
-        </p:style>
-        <p:txBody>
-          <a:bodyPr rtlCol="0" anchor="ctr"/>
-          <a:lstStyle/>
-          <a:p>
-            <a:pPr algn="ctr"/>
-            <a:endParaRPr lang="ko-KR" altLang="en-US" sz="1600" dirty="0">
-              <a:solidFill>
-                <a:schemeClr val="tx1"/>
-              </a:solidFill>
-            </a:endParaRPr>
-          </a:p>
-        </p:txBody>
-      </p:sp>
-      <p:sp>
-        <p:nvSpPr>
-          <p:cNvPr id="24" name="직사각형 23">
-            <a:extLst>
-              <a:ext uri="{FF2B5EF4-FFF2-40B4-BE49-F238E27FC236}">
-                <a16:creationId xmlns:a16="http://schemas.microsoft.com/office/drawing/2014/main" id="{2501AF8A-8CC9-4181-8BE6-5E4838E8E9E2}"/>
-              </a:ext>
-            </a:extLst>
-          </p:cNvPr>
-          <p:cNvSpPr/>
-          <p:nvPr/>
-        </p:nvSpPr>
-        <p:spPr>
-          <a:xfrm>
-            <a:off x="3051020" y="4444655"/>
-            <a:ext cx="5859410" cy="2171527"/>
-          </a:xfrm>
-          <a:prstGeom prst="rect">
-            <a:avLst/>
-          </a:prstGeom>
-          <a:solidFill>
-            <a:srgbClr val="FFC000">
-              <a:alpha val="56000"/>
-            </a:srgbClr>
-          </a:solidFill>
-          <a:ln>
-            <a:noFill/>
-          </a:ln>
-        </p:spPr>
-        <p:style>
-          <a:lnRef idx="2">
-            <a:schemeClr val="accent1">
-              <a:shade val="50000"/>
-            </a:schemeClr>
-          </a:lnRef>
-          <a:fillRef idx="1">
-            <a:schemeClr val="accent1"/>
-          </a:fillRef>
-          <a:effectRef idx="0">
-            <a:schemeClr val="accent1"/>
-          </a:effectRef>
-          <a:fontRef idx="minor">
-            <a:schemeClr val="lt1"/>
-          </a:fontRef>
-        </p:style>
-        <p:txBody>
-          <a:bodyPr rtlCol="0" anchor="ctr"/>
-          <a:lstStyle/>
-          <a:p>
-            <a:pPr algn="ctr"/>
-            <a:r>
-              <a:rPr lang="en-US" altLang="ko-KR" sz="1600" dirty="0">
-                <a:solidFill>
-                  <a:schemeClr val="tx1"/>
-                </a:solidFill>
-              </a:rPr>
-              <a:t>File Name &lt;utf-16le&gt;</a:t>
-            </a:r>
-          </a:p>
-          <a:p>
-            <a:pPr algn="ctr"/>
-            <a:r>
-              <a:rPr lang="en-US" altLang="ko-KR" sz="1600" dirty="0">
-                <a:solidFill>
-                  <a:schemeClr val="tx1"/>
-                </a:solidFill>
-              </a:rPr>
-              <a:t>(548 byte)</a:t>
-            </a:r>
-            <a:endParaRPr lang="ko-KR" altLang="en-US" sz="1600" dirty="0">
-              <a:solidFill>
-                <a:schemeClr val="tx1"/>
-              </a:solidFill>
-            </a:endParaRPr>
-          </a:p>
-        </p:txBody>
-      </p:sp>
-      <p:cxnSp>
-        <p:nvCxnSpPr>
-          <p:cNvPr id="3" name="직선 연결선 2">
-            <a:extLst>
-              <a:ext uri="{FF2B5EF4-FFF2-40B4-BE49-F238E27FC236}">
-                <a16:creationId xmlns:a16="http://schemas.microsoft.com/office/drawing/2014/main" id="{3589C398-914D-4457-9051-A54CD13BAB07}"/>
-              </a:ext>
-            </a:extLst>
-          </p:cNvPr>
-          <p:cNvCxnSpPr/>
-          <p:nvPr/>
-        </p:nvCxnSpPr>
-        <p:spPr>
-          <a:xfrm>
-            <a:off x="5960062" y="6991350"/>
-            <a:ext cx="0" cy="590550"/>
-          </a:xfrm>
-          <a:prstGeom prst="line">
-            <a:avLst/>
-          </a:prstGeom>
-          <a:ln w="28575">
-            <a:solidFill>
-              <a:schemeClr val="tx1"/>
-            </a:solidFill>
-            <a:prstDash val="sysDot"/>
-          </a:ln>
-        </p:spPr>
-        <p:style>
-          <a:lnRef idx="1">
-            <a:schemeClr val="accent1"/>
-          </a:lnRef>
-          <a:fillRef idx="0">
-            <a:schemeClr val="accent1"/>
-          </a:fillRef>
-          <a:effectRef idx="0">
-            <a:schemeClr val="accent1"/>
-          </a:effectRef>
-          <a:fontRef idx="minor">
-            <a:schemeClr val="tx1"/>
-          </a:fontRef>
-        </p:style>
-      </p:cxnSp>
     </p:spTree>
     <p:extLst>
       <p:ext uri="{BB962C8B-B14F-4D97-AF65-F5344CB8AC3E}">

</xml_diff>

<commit_message>
tested on 1.1.14405.2 / 1.1.16000.6
</commit_message>
<xml_diff>
--- a/struct.pptx
+++ b/struct.pptx
@@ -260,7 +260,7 @@
           <a:p>
             <a:fld id="{DE15D4B5-AEE3-42ED-9C3B-4D7A2F737357}" type="datetimeFigureOut">
               <a:rPr lang="ko-KR" altLang="en-US" smtClean="0"/>
-              <a:t>2021-11-30</a:t>
+              <a:t>2021-12-01</a:t>
             </a:fld>
             <a:endParaRPr lang="ko-KR" altLang="en-US"/>
           </a:p>
@@ -458,7 +458,7 @@
           <a:p>
             <a:fld id="{DE15D4B5-AEE3-42ED-9C3B-4D7A2F737357}" type="datetimeFigureOut">
               <a:rPr lang="ko-KR" altLang="en-US" smtClean="0"/>
-              <a:t>2021-11-30</a:t>
+              <a:t>2021-12-01</a:t>
             </a:fld>
             <a:endParaRPr lang="ko-KR" altLang="en-US"/>
           </a:p>
@@ -666,7 +666,7 @@
           <a:p>
             <a:fld id="{DE15D4B5-AEE3-42ED-9C3B-4D7A2F737357}" type="datetimeFigureOut">
               <a:rPr lang="ko-KR" altLang="en-US" smtClean="0"/>
-              <a:t>2021-11-30</a:t>
+              <a:t>2021-12-01</a:t>
             </a:fld>
             <a:endParaRPr lang="ko-KR" altLang="en-US"/>
           </a:p>
@@ -864,7 +864,7 @@
           <a:p>
             <a:fld id="{DE15D4B5-AEE3-42ED-9C3B-4D7A2F737357}" type="datetimeFigureOut">
               <a:rPr lang="ko-KR" altLang="en-US" smtClean="0"/>
-              <a:t>2021-11-30</a:t>
+              <a:t>2021-12-01</a:t>
             </a:fld>
             <a:endParaRPr lang="ko-KR" altLang="en-US"/>
           </a:p>
@@ -1139,7 +1139,7 @@
           <a:p>
             <a:fld id="{DE15D4B5-AEE3-42ED-9C3B-4D7A2F737357}" type="datetimeFigureOut">
               <a:rPr lang="ko-KR" altLang="en-US" smtClean="0"/>
-              <a:t>2021-11-30</a:t>
+              <a:t>2021-12-01</a:t>
             </a:fld>
             <a:endParaRPr lang="ko-KR" altLang="en-US"/>
           </a:p>
@@ -1404,7 +1404,7 @@
           <a:p>
             <a:fld id="{DE15D4B5-AEE3-42ED-9C3B-4D7A2F737357}" type="datetimeFigureOut">
               <a:rPr lang="ko-KR" altLang="en-US" smtClean="0"/>
-              <a:t>2021-11-30</a:t>
+              <a:t>2021-12-01</a:t>
             </a:fld>
             <a:endParaRPr lang="ko-KR" altLang="en-US"/>
           </a:p>
@@ -1816,7 +1816,7 @@
           <a:p>
             <a:fld id="{DE15D4B5-AEE3-42ED-9C3B-4D7A2F737357}" type="datetimeFigureOut">
               <a:rPr lang="ko-KR" altLang="en-US" smtClean="0"/>
-              <a:t>2021-11-30</a:t>
+              <a:t>2021-12-01</a:t>
             </a:fld>
             <a:endParaRPr lang="ko-KR" altLang="en-US"/>
           </a:p>
@@ -1957,7 +1957,7 @@
           <a:p>
             <a:fld id="{DE15D4B5-AEE3-42ED-9C3B-4D7A2F737357}" type="datetimeFigureOut">
               <a:rPr lang="ko-KR" altLang="en-US" smtClean="0"/>
-              <a:t>2021-11-30</a:t>
+              <a:t>2021-12-01</a:t>
             </a:fld>
             <a:endParaRPr lang="ko-KR" altLang="en-US"/>
           </a:p>
@@ -2070,7 +2070,7 @@
           <a:p>
             <a:fld id="{DE15D4B5-AEE3-42ED-9C3B-4D7A2F737357}" type="datetimeFigureOut">
               <a:rPr lang="ko-KR" altLang="en-US" smtClean="0"/>
-              <a:t>2021-11-30</a:t>
+              <a:t>2021-12-01</a:t>
             </a:fld>
             <a:endParaRPr lang="ko-KR" altLang="en-US"/>
           </a:p>
@@ -2381,7 +2381,7 @@
           <a:p>
             <a:fld id="{DE15D4B5-AEE3-42ED-9C3B-4D7A2F737357}" type="datetimeFigureOut">
               <a:rPr lang="ko-KR" altLang="en-US" smtClean="0"/>
-              <a:t>2021-11-30</a:t>
+              <a:t>2021-12-01</a:t>
             </a:fld>
             <a:endParaRPr lang="ko-KR" altLang="en-US"/>
           </a:p>
@@ -2669,7 +2669,7 @@
           <a:p>
             <a:fld id="{DE15D4B5-AEE3-42ED-9C3B-4D7A2F737357}" type="datetimeFigureOut">
               <a:rPr lang="ko-KR" altLang="en-US" smtClean="0"/>
-              <a:t>2021-11-30</a:t>
+              <a:t>2021-12-01</a:t>
             </a:fld>
             <a:endParaRPr lang="ko-KR" altLang="en-US"/>
           </a:p>
@@ -2910,7 +2910,7 @@
           <a:p>
             <a:fld id="{DE15D4B5-AEE3-42ED-9C3B-4D7A2F737357}" type="datetimeFigureOut">
               <a:rPr lang="ko-KR" altLang="en-US" smtClean="0"/>
-              <a:t>2021-11-30</a:t>
+              <a:t>2021-12-01</a:t>
             </a:fld>
             <a:endParaRPr lang="ko-KR" altLang="en-US"/>
           </a:p>
@@ -4530,6 +4530,91 @@
           </a:p>
         </p:txBody>
       </p:sp>
+      <p:cxnSp>
+        <p:nvCxnSpPr>
+          <p:cNvPr id="4" name="연결선: 꺾임 3">
+            <a:extLst>
+              <a:ext uri="{FF2B5EF4-FFF2-40B4-BE49-F238E27FC236}">
+                <a16:creationId xmlns:a16="http://schemas.microsoft.com/office/drawing/2014/main" id="{B59A09FD-FA6F-4E61-8370-7F2E45FC1120}"/>
+              </a:ext>
+            </a:extLst>
+          </p:cNvPr>
+          <p:cNvCxnSpPr>
+            <a:cxnSpLocks/>
+          </p:cNvCxnSpPr>
+          <p:nvPr/>
+        </p:nvCxnSpPr>
+        <p:spPr>
+          <a:xfrm rot="5400000" flipH="1" flipV="1">
+            <a:off x="2446545" y="408098"/>
+            <a:ext cx="378782" cy="1038350"/>
+          </a:xfrm>
+          <a:prstGeom prst="bentConnector2">
+            <a:avLst/>
+          </a:prstGeom>
+          <a:ln w="28575">
+            <a:solidFill>
+              <a:schemeClr val="tx1"/>
+            </a:solidFill>
+            <a:headEnd type="none" w="med" len="med"/>
+            <a:tailEnd type="arrow" w="med" len="med"/>
+          </a:ln>
+        </p:spPr>
+        <p:style>
+          <a:lnRef idx="1">
+            <a:schemeClr val="accent1"/>
+          </a:lnRef>
+          <a:fillRef idx="0">
+            <a:schemeClr val="accent1"/>
+          </a:fillRef>
+          <a:effectRef idx="0">
+            <a:schemeClr val="accent1"/>
+          </a:effectRef>
+          <a:fontRef idx="minor">
+            <a:schemeClr val="tx1"/>
+          </a:fontRef>
+        </p:style>
+      </p:cxnSp>
+      <p:sp>
+        <p:nvSpPr>
+          <p:cNvPr id="5" name="TextBox 4">
+            <a:extLst>
+              <a:ext uri="{FF2B5EF4-FFF2-40B4-BE49-F238E27FC236}">
+                <a16:creationId xmlns:a16="http://schemas.microsoft.com/office/drawing/2014/main" id="{0ABE350C-2D13-4CA6-9ABB-8D6E9F44F646}"/>
+              </a:ext>
+            </a:extLst>
+          </p:cNvPr>
+          <p:cNvSpPr txBox="1"/>
+          <p:nvPr/>
+        </p:nvSpPr>
+        <p:spPr>
+          <a:xfrm>
+            <a:off x="3205738" y="494589"/>
+            <a:ext cx="4213461" cy="369332"/>
+          </a:xfrm>
+          <a:prstGeom prst="rect">
+            <a:avLst/>
+          </a:prstGeom>
+          <a:noFill/>
+        </p:spPr>
+        <p:txBody>
+          <a:bodyPr wrap="none" rtlCol="0">
+            <a:spAutoFit/>
+          </a:bodyPr>
+          <a:lstStyle/>
+          <a:p>
+            <a:r>
+              <a:rPr lang="en-US" altLang="ko-KR" dirty="0"/>
+              <a:t>different by each version of </a:t>
+            </a:r>
+            <a:r>
+              <a:rPr lang="en-US" altLang="ko-KR" dirty="0" err="1"/>
+              <a:t>mpengine</a:t>
+            </a:r>
+            <a:endParaRPr lang="ko-KR" altLang="en-US" dirty="0"/>
+          </a:p>
+        </p:txBody>
+      </p:sp>
     </p:spTree>
     <p:extLst>
       <p:ext uri="{BB962C8B-B14F-4D97-AF65-F5344CB8AC3E}">

</xml_diff>